<commit_message>
add while loops whiteboard slide
</commit_message>
<xml_diff>
--- a/WhileLoops/WhileLoops.pptx
+++ b/WhileLoops/WhileLoops.pptx
@@ -12,7 +12,7 @@
     <p:sldId id="277" r:id="rId3"/>
     <p:sldId id="278" r:id="rId4"/>
     <p:sldId id="279" r:id="rId5"/>
-    <p:sldId id="280" r:id="rId6"/>
+    <p:sldId id="283" r:id="rId6"/>
     <p:sldId id="262" r:id="rId7"/>
     <p:sldId id="282" r:id="rId8"/>
     <p:sldId id="281" r:id="rId9"/>
@@ -953,7 +953,7 @@
     </p:spTree>
     <p:extLst>
       <p:ext uri="{BB962C8B-B14F-4D97-AF65-F5344CB8AC3E}">
-        <p14:creationId xmlns:p14="http://schemas.microsoft.com/office/powerpoint/2010/main" val="1558282800"/>
+        <p14:creationId xmlns:p14="http://schemas.microsoft.com/office/powerpoint/2010/main" val="2489498827"/>
       </p:ext>
     </p:extLst>
   </p:cSld>
@@ -36917,7 +36917,12 @@
             <p:ph idx="1"/>
           </p:nvPr>
         </p:nvSpPr>
-        <p:spPr/>
+        <p:spPr>
+          <a:xfrm>
+            <a:off x="2209800" y="1189703"/>
+            <a:ext cx="10744200" cy="5372100"/>
+          </a:xfrm>
+        </p:spPr>
         <p:txBody>
           <a:bodyPr>
             <a:normAutofit/>
@@ -37097,8 +37102,32 @@
                 </a:solidFill>
                 <a:latin typeface="Consolas" panose="020B0609020204030204" pitchFamily="49" charset="0"/>
               </a:rPr>
-              <a:t>	count++;</a:t>
+              <a:t>	</a:t>
             </a:r>
+            <a:r>
+              <a:rPr lang="en-US" sz="4000" dirty="0" smtClean="0">
+                <a:solidFill>
+                  <a:srgbClr val="000000"/>
+                </a:solidFill>
+                <a:latin typeface="Consolas" panose="020B0609020204030204" pitchFamily="49" charset="0"/>
+              </a:rPr>
+              <a:t>count </a:t>
+            </a:r>
+            <a:r>
+              <a:rPr lang="en-US" sz="4000" smtClean="0">
+                <a:solidFill>
+                  <a:srgbClr val="000000"/>
+                </a:solidFill>
+                <a:latin typeface="Consolas" panose="020B0609020204030204" pitchFamily="49" charset="0"/>
+              </a:rPr>
+              <a:t>= count + 1;</a:t>
+            </a:r>
+            <a:endParaRPr lang="en-US" sz="4000" dirty="0">
+              <a:solidFill>
+                <a:srgbClr val="000000"/>
+              </a:solidFill>
+              <a:latin typeface="Consolas" panose="020B0609020204030204" pitchFamily="49" charset="0"/>
+            </a:endParaRPr>
           </a:p>
           <a:p>
             <a:pPr marL="0" indent="0">
@@ -37122,10 +37151,627 @@
           </a:p>
         </p:txBody>
       </p:sp>
+      <p:grpSp>
+        <p:nvGrpSpPr>
+          <p:cNvPr id="6" name="Group 5"/>
+          <p:cNvGrpSpPr/>
+          <p:nvPr/>
+        </p:nvGrpSpPr>
+        <p:grpSpPr>
+          <a:xfrm>
+            <a:off x="-17166" y="2400300"/>
+            <a:ext cx="2171700" cy="1028700"/>
+            <a:chOff x="-762000" y="1257300"/>
+            <a:chExt cx="1828800" cy="1028700"/>
+          </a:xfrm>
+        </p:grpSpPr>
+        <p:sp>
+          <p:nvSpPr>
+            <p:cNvPr id="4" name="Right Arrow 3"/>
+            <p:cNvSpPr/>
+            <p:nvPr/>
+          </p:nvSpPr>
+          <p:spPr bwMode="auto">
+            <a:xfrm>
+              <a:off x="-647700" y="1257300"/>
+              <a:ext cx="1600200" cy="1028700"/>
+            </a:xfrm>
+            <a:prstGeom prst="rightArrow">
+              <a:avLst/>
+            </a:prstGeom>
+            <a:solidFill>
+              <a:schemeClr val="accent5"/>
+            </a:solidFill>
+            <a:ln w="12700">
+              <a:solidFill>
+                <a:schemeClr val="tx2"/>
+              </a:solidFill>
+              <a:miter lim="800000"/>
+              <a:headEnd type="none" w="med" len="med"/>
+              <a:tailEnd type="none" w="med" len="med"/>
+            </a:ln>
+            <a:effectLst/>
+          </p:spPr>
+          <p:style>
+            <a:lnRef idx="1">
+              <a:schemeClr val="accent2"/>
+            </a:lnRef>
+            <a:fillRef idx="3">
+              <a:schemeClr val="accent2"/>
+            </a:fillRef>
+            <a:effectRef idx="2">
+              <a:schemeClr val="accent2"/>
+            </a:effectRef>
+            <a:fontRef idx="minor">
+              <a:schemeClr val="lt1"/>
+            </a:fontRef>
+          </p:style>
+          <p:txBody>
+            <a:bodyPr rot="0" spcFirstLastPara="0" vertOverflow="overflow" horzOverflow="overflow" vert="horz" wrap="square" lIns="182880" tIns="146304" rIns="182880" bIns="146304" numCol="1" spcCol="0" rtlCol="0" fromWordArt="0" anchor="t" anchorCtr="0" forceAA="0" compatLnSpc="1">
+              <a:prstTxWarp prst="textNoShape">
+                <a:avLst/>
+              </a:prstTxWarp>
+              <a:noAutofit/>
+            </a:bodyPr>
+            <a:lstStyle/>
+            <a:p>
+              <a:pPr algn="ctr" defTabSz="932472" fontAlgn="base">
+                <a:lnSpc>
+                  <a:spcPct val="90000"/>
+                </a:lnSpc>
+                <a:spcBef>
+                  <a:spcPct val="0"/>
+                </a:spcBef>
+                <a:spcAft>
+                  <a:spcPct val="0"/>
+                </a:spcAft>
+              </a:pPr>
+              <a:endParaRPr lang="en-US" sz="1000" dirty="0" smtClean="0">
+                <a:solidFill>
+                  <a:schemeClr val="tx1">
+                    <a:lumMod val="50000"/>
+                  </a:schemeClr>
+                </a:solidFill>
+                <a:ea typeface="Segoe UI" pitchFamily="34" charset="0"/>
+                <a:cs typeface="Segoe UI" pitchFamily="34" charset="0"/>
+              </a:endParaRPr>
+            </a:p>
+          </p:txBody>
+        </p:sp>
+        <p:sp>
+          <p:nvSpPr>
+            <p:cNvPr id="5" name="TextBox 4"/>
+            <p:cNvSpPr txBox="1"/>
+            <p:nvPr/>
+          </p:nvSpPr>
+          <p:spPr>
+            <a:xfrm>
+              <a:off x="-762000" y="1448313"/>
+              <a:ext cx="1828800" cy="627864"/>
+            </a:xfrm>
+            <a:prstGeom prst="rect">
+              <a:avLst/>
+            </a:prstGeom>
+            <a:noFill/>
+          </p:spPr>
+          <p:txBody>
+            <a:bodyPr wrap="square" lIns="182880" tIns="146304" rIns="182880" bIns="146304" rtlCol="0">
+              <a:spAutoFit/>
+            </a:bodyPr>
+            <a:lstStyle/>
+            <a:p>
+              <a:pPr>
+                <a:lnSpc>
+                  <a:spcPct val="90000"/>
+                </a:lnSpc>
+                <a:spcAft>
+                  <a:spcPts val="600"/>
+                </a:spcAft>
+              </a:pPr>
+              <a:endParaRPr lang="en-US" sz="2400" dirty="0">
+                <a:solidFill>
+                  <a:schemeClr val="tx1">
+                    <a:lumMod val="50000"/>
+                  </a:schemeClr>
+                </a:solidFill>
+                <a:ea typeface="Segoe UI" pitchFamily="34" charset="0"/>
+                <a:cs typeface="Segoe UI" pitchFamily="34" charset="0"/>
+              </a:endParaRPr>
+            </a:p>
+          </p:txBody>
+        </p:sp>
+      </p:grpSp>
+      <p:sp>
+        <p:nvSpPr>
+          <p:cNvPr id="7" name="TextBox 6"/>
+          <p:cNvSpPr txBox="1"/>
+          <p:nvPr/>
+        </p:nvSpPr>
+        <p:spPr>
+          <a:xfrm>
+            <a:off x="7239000" y="1207937"/>
+            <a:ext cx="2286000" cy="849463"/>
+          </a:xfrm>
+          <a:prstGeom prst="rect">
+            <a:avLst/>
+          </a:prstGeom>
+          <a:solidFill>
+            <a:schemeClr val="accent5"/>
+          </a:solidFill>
+        </p:spPr>
+        <p:txBody>
+          <a:bodyPr wrap="square" lIns="182880" tIns="146304" rIns="182880" bIns="146304" rtlCol="0">
+            <a:spAutoFit/>
+          </a:bodyPr>
+          <a:lstStyle/>
+          <a:p>
+            <a:pPr>
+              <a:lnSpc>
+                <a:spcPct val="90000"/>
+              </a:lnSpc>
+              <a:spcAft>
+                <a:spcPts val="600"/>
+              </a:spcAft>
+            </a:pPr>
+            <a:r>
+              <a:rPr lang="en-US" sz="4000" dirty="0" smtClean="0">
+                <a:gradFill>
+                  <a:gsLst>
+                    <a:gs pos="2917">
+                      <a:schemeClr val="tx1"/>
+                    </a:gs>
+                    <a:gs pos="30000">
+                      <a:schemeClr val="tx1"/>
+                    </a:gs>
+                  </a:gsLst>
+                  <a:lin ang="5400000" scaled="0"/>
+                </a:gradFill>
+              </a:rPr>
+              <a:t>count is: </a:t>
+            </a:r>
+          </a:p>
+        </p:txBody>
+      </p:sp>
+      <p:sp>
+        <p:nvSpPr>
+          <p:cNvPr id="8" name="TextBox 7"/>
+          <p:cNvSpPr txBox="1"/>
+          <p:nvPr/>
+        </p:nvSpPr>
+        <p:spPr>
+          <a:xfrm>
+            <a:off x="9260681" y="1207937"/>
+            <a:ext cx="876300" cy="849463"/>
+          </a:xfrm>
+          <a:prstGeom prst="rect">
+            <a:avLst/>
+          </a:prstGeom>
+          <a:solidFill>
+            <a:schemeClr val="accent5"/>
+          </a:solidFill>
+        </p:spPr>
+        <p:txBody>
+          <a:bodyPr wrap="square" lIns="182880" tIns="146304" rIns="182880" bIns="146304" rtlCol="0">
+            <a:spAutoFit/>
+          </a:bodyPr>
+          <a:lstStyle/>
+          <a:p>
+            <a:pPr>
+              <a:lnSpc>
+                <a:spcPct val="90000"/>
+              </a:lnSpc>
+              <a:spcAft>
+                <a:spcPts val="600"/>
+              </a:spcAft>
+            </a:pPr>
+            <a:r>
+              <a:rPr lang="en-US" sz="4000" dirty="0" smtClean="0">
+                <a:gradFill>
+                  <a:gsLst>
+                    <a:gs pos="2917">
+                      <a:schemeClr val="tx1"/>
+                    </a:gs>
+                    <a:gs pos="30000">
+                      <a:schemeClr val="tx1"/>
+                    </a:gs>
+                  </a:gsLst>
+                  <a:lin ang="5400000" scaled="0"/>
+                </a:gradFill>
+              </a:rPr>
+              <a:t>0</a:t>
+            </a:r>
+          </a:p>
+        </p:txBody>
+      </p:sp>
+      <p:sp>
+        <p:nvSpPr>
+          <p:cNvPr id="9" name="TextBox 8"/>
+          <p:cNvSpPr txBox="1"/>
+          <p:nvPr/>
+        </p:nvSpPr>
+        <p:spPr>
+          <a:xfrm>
+            <a:off x="9277847" y="1207937"/>
+            <a:ext cx="876300" cy="849463"/>
+          </a:xfrm>
+          <a:prstGeom prst="rect">
+            <a:avLst/>
+          </a:prstGeom>
+          <a:solidFill>
+            <a:schemeClr val="accent5"/>
+          </a:solidFill>
+        </p:spPr>
+        <p:txBody>
+          <a:bodyPr wrap="square" lIns="182880" tIns="146304" rIns="182880" bIns="146304" rtlCol="0">
+            <a:spAutoFit/>
+          </a:bodyPr>
+          <a:lstStyle/>
+          <a:p>
+            <a:pPr>
+              <a:lnSpc>
+                <a:spcPct val="90000"/>
+              </a:lnSpc>
+              <a:spcAft>
+                <a:spcPts val="600"/>
+              </a:spcAft>
+            </a:pPr>
+            <a:r>
+              <a:rPr lang="en-US" sz="4000" dirty="0" smtClean="0">
+                <a:gradFill>
+                  <a:gsLst>
+                    <a:gs pos="2917">
+                      <a:schemeClr val="tx1"/>
+                    </a:gs>
+                    <a:gs pos="30000">
+                      <a:schemeClr val="tx1"/>
+                    </a:gs>
+                  </a:gsLst>
+                  <a:lin ang="5400000" scaled="0"/>
+                </a:gradFill>
+              </a:rPr>
+              <a:t>1</a:t>
+            </a:r>
+          </a:p>
+        </p:txBody>
+      </p:sp>
+      <p:sp>
+        <p:nvSpPr>
+          <p:cNvPr id="10" name="TextBox 9"/>
+          <p:cNvSpPr txBox="1"/>
+          <p:nvPr/>
+        </p:nvSpPr>
+        <p:spPr>
+          <a:xfrm>
+            <a:off x="9277847" y="1207937"/>
+            <a:ext cx="876300" cy="849463"/>
+          </a:xfrm>
+          <a:prstGeom prst="rect">
+            <a:avLst/>
+          </a:prstGeom>
+          <a:solidFill>
+            <a:schemeClr val="accent5"/>
+          </a:solidFill>
+        </p:spPr>
+        <p:txBody>
+          <a:bodyPr wrap="square" lIns="182880" tIns="146304" rIns="182880" bIns="146304" rtlCol="0">
+            <a:spAutoFit/>
+          </a:bodyPr>
+          <a:lstStyle/>
+          <a:p>
+            <a:pPr>
+              <a:lnSpc>
+                <a:spcPct val="90000"/>
+              </a:lnSpc>
+              <a:spcAft>
+                <a:spcPts val="600"/>
+              </a:spcAft>
+            </a:pPr>
+            <a:r>
+              <a:rPr lang="en-US" sz="4000" dirty="0" smtClean="0">
+                <a:gradFill>
+                  <a:gsLst>
+                    <a:gs pos="2917">
+                      <a:schemeClr val="tx1"/>
+                    </a:gs>
+                    <a:gs pos="30000">
+                      <a:schemeClr val="tx1"/>
+                    </a:gs>
+                  </a:gsLst>
+                  <a:lin ang="5400000" scaled="0"/>
+                </a:gradFill>
+              </a:rPr>
+              <a:t>2</a:t>
+            </a:r>
+          </a:p>
+        </p:txBody>
+      </p:sp>
+      <p:sp>
+        <p:nvSpPr>
+          <p:cNvPr id="11" name="TextBox 10"/>
+          <p:cNvSpPr txBox="1"/>
+          <p:nvPr/>
+        </p:nvSpPr>
+        <p:spPr>
+          <a:xfrm>
+            <a:off x="9277847" y="1207936"/>
+            <a:ext cx="876300" cy="849463"/>
+          </a:xfrm>
+          <a:prstGeom prst="rect">
+            <a:avLst/>
+          </a:prstGeom>
+          <a:solidFill>
+            <a:schemeClr val="accent5"/>
+          </a:solidFill>
+        </p:spPr>
+        <p:txBody>
+          <a:bodyPr wrap="square" lIns="182880" tIns="146304" rIns="182880" bIns="146304" rtlCol="0">
+            <a:spAutoFit/>
+          </a:bodyPr>
+          <a:lstStyle/>
+          <a:p>
+            <a:pPr>
+              <a:lnSpc>
+                <a:spcPct val="90000"/>
+              </a:lnSpc>
+              <a:spcAft>
+                <a:spcPts val="600"/>
+              </a:spcAft>
+            </a:pPr>
+            <a:r>
+              <a:rPr lang="en-US" sz="4000" dirty="0" smtClean="0">
+                <a:gradFill>
+                  <a:gsLst>
+                    <a:gs pos="2917">
+                      <a:schemeClr val="tx1"/>
+                    </a:gs>
+                    <a:gs pos="30000">
+                      <a:schemeClr val="tx1"/>
+                    </a:gs>
+                  </a:gsLst>
+                  <a:lin ang="5400000" scaled="0"/>
+                </a:gradFill>
+              </a:rPr>
+              <a:t>3</a:t>
+            </a:r>
+          </a:p>
+        </p:txBody>
+      </p:sp>
+      <p:sp>
+        <p:nvSpPr>
+          <p:cNvPr id="12" name="TextBox 11"/>
+          <p:cNvSpPr txBox="1"/>
+          <p:nvPr/>
+        </p:nvSpPr>
+        <p:spPr>
+          <a:xfrm>
+            <a:off x="9277847" y="1207936"/>
+            <a:ext cx="876300" cy="849463"/>
+          </a:xfrm>
+          <a:prstGeom prst="rect">
+            <a:avLst/>
+          </a:prstGeom>
+          <a:solidFill>
+            <a:schemeClr val="accent5"/>
+          </a:solidFill>
+        </p:spPr>
+        <p:txBody>
+          <a:bodyPr wrap="square" lIns="182880" tIns="146304" rIns="182880" bIns="146304" rtlCol="0">
+            <a:spAutoFit/>
+          </a:bodyPr>
+          <a:lstStyle/>
+          <a:p>
+            <a:pPr>
+              <a:lnSpc>
+                <a:spcPct val="90000"/>
+              </a:lnSpc>
+              <a:spcAft>
+                <a:spcPts val="600"/>
+              </a:spcAft>
+            </a:pPr>
+            <a:r>
+              <a:rPr lang="en-US" sz="4000" dirty="0" smtClean="0">
+                <a:gradFill>
+                  <a:gsLst>
+                    <a:gs pos="2917">
+                      <a:schemeClr val="tx1"/>
+                    </a:gs>
+                    <a:gs pos="30000">
+                      <a:schemeClr val="tx1"/>
+                    </a:gs>
+                  </a:gsLst>
+                  <a:lin ang="5400000" scaled="0"/>
+                </a:gradFill>
+              </a:rPr>
+              <a:t>4</a:t>
+            </a:r>
+          </a:p>
+        </p:txBody>
+      </p:sp>
+      <p:sp>
+        <p:nvSpPr>
+          <p:cNvPr id="13" name="TextBox 12"/>
+          <p:cNvSpPr txBox="1"/>
+          <p:nvPr/>
+        </p:nvSpPr>
+        <p:spPr>
+          <a:xfrm>
+            <a:off x="9277847" y="1207935"/>
+            <a:ext cx="876300" cy="849463"/>
+          </a:xfrm>
+          <a:prstGeom prst="rect">
+            <a:avLst/>
+          </a:prstGeom>
+          <a:solidFill>
+            <a:schemeClr val="accent5"/>
+          </a:solidFill>
+        </p:spPr>
+        <p:txBody>
+          <a:bodyPr wrap="square" lIns="182880" tIns="146304" rIns="182880" bIns="146304" rtlCol="0">
+            <a:spAutoFit/>
+          </a:bodyPr>
+          <a:lstStyle/>
+          <a:p>
+            <a:pPr>
+              <a:lnSpc>
+                <a:spcPct val="90000"/>
+              </a:lnSpc>
+              <a:spcAft>
+                <a:spcPts val="600"/>
+              </a:spcAft>
+            </a:pPr>
+            <a:r>
+              <a:rPr lang="en-US" sz="4000" dirty="0" smtClean="0">
+                <a:gradFill>
+                  <a:gsLst>
+                    <a:gs pos="2917">
+                      <a:schemeClr val="tx1"/>
+                    </a:gs>
+                    <a:gs pos="30000">
+                      <a:schemeClr val="tx1"/>
+                    </a:gs>
+                  </a:gsLst>
+                  <a:lin ang="5400000" scaled="0"/>
+                </a:gradFill>
+              </a:rPr>
+              <a:t>5</a:t>
+            </a:r>
+          </a:p>
+        </p:txBody>
+      </p:sp>
+      <p:grpSp>
+        <p:nvGrpSpPr>
+          <p:cNvPr id="15" name="Group 14"/>
+          <p:cNvGrpSpPr/>
+          <p:nvPr/>
+        </p:nvGrpSpPr>
+        <p:grpSpPr>
+          <a:xfrm>
+            <a:off x="-17166" y="6047453"/>
+            <a:ext cx="2171700" cy="1028700"/>
+            <a:chOff x="-762000" y="1257300"/>
+            <a:chExt cx="1828800" cy="1028700"/>
+          </a:xfrm>
+        </p:grpSpPr>
+        <p:sp>
+          <p:nvSpPr>
+            <p:cNvPr id="16" name="Right Arrow 15"/>
+            <p:cNvSpPr/>
+            <p:nvPr/>
+          </p:nvSpPr>
+          <p:spPr bwMode="auto">
+            <a:xfrm>
+              <a:off x="-647700" y="1257300"/>
+              <a:ext cx="1600200" cy="1028700"/>
+            </a:xfrm>
+            <a:prstGeom prst="rightArrow">
+              <a:avLst/>
+            </a:prstGeom>
+            <a:solidFill>
+              <a:schemeClr val="accent5"/>
+            </a:solidFill>
+            <a:ln w="12700">
+              <a:solidFill>
+                <a:schemeClr val="tx2"/>
+              </a:solidFill>
+              <a:miter lim="800000"/>
+              <a:headEnd type="none" w="med" len="med"/>
+              <a:tailEnd type="none" w="med" len="med"/>
+            </a:ln>
+            <a:effectLst/>
+          </p:spPr>
+          <p:style>
+            <a:lnRef idx="1">
+              <a:schemeClr val="accent2"/>
+            </a:lnRef>
+            <a:fillRef idx="3">
+              <a:schemeClr val="accent2"/>
+            </a:fillRef>
+            <a:effectRef idx="2">
+              <a:schemeClr val="accent2"/>
+            </a:effectRef>
+            <a:fontRef idx="minor">
+              <a:schemeClr val="lt1"/>
+            </a:fontRef>
+          </p:style>
+          <p:txBody>
+            <a:bodyPr rot="0" spcFirstLastPara="0" vertOverflow="overflow" horzOverflow="overflow" vert="horz" wrap="square" lIns="182880" tIns="146304" rIns="182880" bIns="146304" numCol="1" spcCol="0" rtlCol="0" fromWordArt="0" anchor="t" anchorCtr="0" forceAA="0" compatLnSpc="1">
+              <a:prstTxWarp prst="textNoShape">
+                <a:avLst/>
+              </a:prstTxWarp>
+              <a:noAutofit/>
+            </a:bodyPr>
+            <a:lstStyle/>
+            <a:p>
+              <a:pPr algn="ctr" defTabSz="932472" fontAlgn="base">
+                <a:lnSpc>
+                  <a:spcPct val="90000"/>
+                </a:lnSpc>
+                <a:spcBef>
+                  <a:spcPct val="0"/>
+                </a:spcBef>
+                <a:spcAft>
+                  <a:spcPct val="0"/>
+                </a:spcAft>
+              </a:pPr>
+              <a:endParaRPr lang="en-US" sz="1000" dirty="0" smtClean="0">
+                <a:solidFill>
+                  <a:schemeClr val="tx1">
+                    <a:lumMod val="50000"/>
+                  </a:schemeClr>
+                </a:solidFill>
+                <a:ea typeface="Segoe UI" pitchFamily="34" charset="0"/>
+                <a:cs typeface="Segoe UI" pitchFamily="34" charset="0"/>
+              </a:endParaRPr>
+            </a:p>
+          </p:txBody>
+        </p:sp>
+        <p:sp>
+          <p:nvSpPr>
+            <p:cNvPr id="17" name="TextBox 16"/>
+            <p:cNvSpPr txBox="1"/>
+            <p:nvPr/>
+          </p:nvSpPr>
+          <p:spPr>
+            <a:xfrm>
+              <a:off x="-762000" y="1448313"/>
+              <a:ext cx="1828800" cy="627864"/>
+            </a:xfrm>
+            <a:prstGeom prst="rect">
+              <a:avLst/>
+            </a:prstGeom>
+            <a:noFill/>
+          </p:spPr>
+          <p:txBody>
+            <a:bodyPr wrap="square" lIns="182880" tIns="146304" rIns="182880" bIns="146304" rtlCol="0">
+              <a:spAutoFit/>
+            </a:bodyPr>
+            <a:lstStyle/>
+            <a:p>
+              <a:pPr>
+                <a:lnSpc>
+                  <a:spcPct val="90000"/>
+                </a:lnSpc>
+                <a:spcAft>
+                  <a:spcPts val="600"/>
+                </a:spcAft>
+              </a:pPr>
+              <a:endParaRPr lang="en-US" sz="2400" dirty="0">
+                <a:solidFill>
+                  <a:schemeClr val="tx1">
+                    <a:lumMod val="50000"/>
+                  </a:schemeClr>
+                </a:solidFill>
+                <a:ea typeface="Segoe UI" pitchFamily="34" charset="0"/>
+                <a:cs typeface="Segoe UI" pitchFamily="34" charset="0"/>
+              </a:endParaRPr>
+            </a:p>
+          </p:txBody>
+        </p:sp>
+      </p:grpSp>
     </p:spTree>
     <p:extLst>
       <p:ext uri="{BB962C8B-B14F-4D97-AF65-F5344CB8AC3E}">
-        <p14:creationId xmlns:p14="http://schemas.microsoft.com/office/powerpoint/2010/main" val="2053469018"/>
+        <p14:creationId xmlns:p14="http://schemas.microsoft.com/office/powerpoint/2010/main" val="385379431"/>
       </p:ext>
     </p:extLst>
   </p:cSld>
@@ -37138,9 +37784,1192 @@
   <p:timing>
     <p:tnLst>
       <p:par>
-        <p:cTn id="1" dur="indefinite" restart="never" nodeType="tmRoot"/>
+        <p:cTn id="1" dur="indefinite" restart="never" nodeType="tmRoot">
+          <p:childTnLst>
+            <p:seq concurrent="1" nextAc="seek">
+              <p:cTn id="2" dur="indefinite" nodeType="mainSeq">
+                <p:childTnLst>
+                  <p:par>
+                    <p:cTn id="3" fill="hold">
+                      <p:stCondLst>
+                        <p:cond delay="indefinite"/>
+                      </p:stCondLst>
+                      <p:childTnLst>
+                        <p:par>
+                          <p:cTn id="4" fill="hold">
+                            <p:stCondLst>
+                              <p:cond delay="0"/>
+                            </p:stCondLst>
+                            <p:childTnLst>
+                              <p:par>
+                                <p:cTn id="5" presetID="1" presetClass="entr" presetSubtype="0" fill="hold" nodeType="clickEffect">
+                                  <p:stCondLst>
+                                    <p:cond delay="0"/>
+                                  </p:stCondLst>
+                                  <p:childTnLst>
+                                    <p:set>
+                                      <p:cBhvr>
+                                        <p:cTn id="6" dur="1" fill="hold">
+                                          <p:stCondLst>
+                                            <p:cond delay="0"/>
+                                          </p:stCondLst>
+                                        </p:cTn>
+                                        <p:tgtEl>
+                                          <p:spTgt spid="6"/>
+                                        </p:tgtEl>
+                                        <p:attrNameLst>
+                                          <p:attrName>style.visibility</p:attrName>
+                                        </p:attrNameLst>
+                                      </p:cBhvr>
+                                      <p:to>
+                                        <p:strVal val="visible"/>
+                                      </p:to>
+                                    </p:set>
+                                  </p:childTnLst>
+                                </p:cTn>
+                              </p:par>
+                            </p:childTnLst>
+                          </p:cTn>
+                        </p:par>
+                      </p:childTnLst>
+                    </p:cTn>
+                  </p:par>
+                  <p:par>
+                    <p:cTn id="7" fill="hold">
+                      <p:stCondLst>
+                        <p:cond delay="indefinite"/>
+                      </p:stCondLst>
+                      <p:childTnLst>
+                        <p:par>
+                          <p:cTn id="8" fill="hold">
+                            <p:stCondLst>
+                              <p:cond delay="0"/>
+                            </p:stCondLst>
+                            <p:childTnLst>
+                              <p:par>
+                                <p:cTn id="9" presetID="1" presetClass="entr" presetSubtype="0" fill="hold" grpId="0" nodeType="clickEffect">
+                                  <p:stCondLst>
+                                    <p:cond delay="0"/>
+                                  </p:stCondLst>
+                                  <p:childTnLst>
+                                    <p:set>
+                                      <p:cBhvr>
+                                        <p:cTn id="10" dur="1" fill="hold">
+                                          <p:stCondLst>
+                                            <p:cond delay="0"/>
+                                          </p:stCondLst>
+                                        </p:cTn>
+                                        <p:tgtEl>
+                                          <p:spTgt spid="7"/>
+                                        </p:tgtEl>
+                                        <p:attrNameLst>
+                                          <p:attrName>style.visibility</p:attrName>
+                                        </p:attrNameLst>
+                                      </p:cBhvr>
+                                      <p:to>
+                                        <p:strVal val="visible"/>
+                                      </p:to>
+                                    </p:set>
+                                  </p:childTnLst>
+                                </p:cTn>
+                              </p:par>
+                              <p:par>
+                                <p:cTn id="11" presetID="1" presetClass="entr" presetSubtype="0" fill="hold" grpId="0" nodeType="withEffect">
+                                  <p:stCondLst>
+                                    <p:cond delay="0"/>
+                                  </p:stCondLst>
+                                  <p:childTnLst>
+                                    <p:set>
+                                      <p:cBhvr>
+                                        <p:cTn id="12" dur="1" fill="hold">
+                                          <p:stCondLst>
+                                            <p:cond delay="0"/>
+                                          </p:stCondLst>
+                                        </p:cTn>
+                                        <p:tgtEl>
+                                          <p:spTgt spid="8"/>
+                                        </p:tgtEl>
+                                        <p:attrNameLst>
+                                          <p:attrName>style.visibility</p:attrName>
+                                        </p:attrNameLst>
+                                      </p:cBhvr>
+                                      <p:to>
+                                        <p:strVal val="visible"/>
+                                      </p:to>
+                                    </p:set>
+                                  </p:childTnLst>
+                                </p:cTn>
+                              </p:par>
+                            </p:childTnLst>
+                          </p:cTn>
+                        </p:par>
+                      </p:childTnLst>
+                    </p:cTn>
+                  </p:par>
+                  <p:par>
+                    <p:cTn id="13" fill="hold">
+                      <p:stCondLst>
+                        <p:cond delay="indefinite"/>
+                      </p:stCondLst>
+                      <p:childTnLst>
+                        <p:par>
+                          <p:cTn id="14" fill="hold">
+                            <p:stCondLst>
+                              <p:cond delay="0"/>
+                            </p:stCondLst>
+                            <p:childTnLst>
+                              <p:par>
+                                <p:cTn id="15" presetID="42" presetClass="path" presetSubtype="0" accel="50000" decel="50000" fill="hold" nodeType="clickEffect">
+                                  <p:stCondLst>
+                                    <p:cond delay="0"/>
+                                  </p:stCondLst>
+                                  <p:childTnLst>
+                                    <p:animMotion origin="layout" path="M -2.08333E-7 5.55112E-17 L -0.00013 0.225 " pathEditMode="relative" rAng="0" ptsTypes="AA">
+                                      <p:cBhvr>
+                                        <p:cTn id="16" dur="2000" fill="hold"/>
+                                        <p:tgtEl>
+                                          <p:spTgt spid="6"/>
+                                        </p:tgtEl>
+                                        <p:attrNameLst>
+                                          <p:attrName>ppt_x</p:attrName>
+                                          <p:attrName>ppt_y</p:attrName>
+                                        </p:attrNameLst>
+                                      </p:cBhvr>
+                                      <p:rCtr x="-13" y="11250"/>
+                                    </p:animMotion>
+                                  </p:childTnLst>
+                                </p:cTn>
+                              </p:par>
+                            </p:childTnLst>
+                          </p:cTn>
+                        </p:par>
+                      </p:childTnLst>
+                    </p:cTn>
+                  </p:par>
+                  <p:par>
+                    <p:cTn id="17" fill="hold">
+                      <p:stCondLst>
+                        <p:cond delay="indefinite"/>
+                      </p:stCondLst>
+                      <p:childTnLst>
+                        <p:par>
+                          <p:cTn id="18" fill="hold">
+                            <p:stCondLst>
+                              <p:cond delay="0"/>
+                            </p:stCondLst>
+                            <p:childTnLst>
+                              <p:par>
+                                <p:cTn id="19" presetID="42" presetClass="path" presetSubtype="0" accel="50000" decel="50000" fill="hold" nodeType="clickEffect">
+                                  <p:stCondLst>
+                                    <p:cond delay="0"/>
+                                  </p:stCondLst>
+                                  <p:childTnLst>
+                                    <p:animMotion origin="layout" path="M -0.00013 0.225 L -0.00013 0.325 " pathEditMode="relative" rAng="0" ptsTypes="AA">
+                                      <p:cBhvr>
+                                        <p:cTn id="20" dur="2000" fill="hold"/>
+                                        <p:tgtEl>
+                                          <p:spTgt spid="6"/>
+                                        </p:tgtEl>
+                                        <p:attrNameLst>
+                                          <p:attrName>ppt_x</p:attrName>
+                                          <p:attrName>ppt_y</p:attrName>
+                                        </p:attrNameLst>
+                                      </p:cBhvr>
+                                      <p:rCtr x="0" y="5000"/>
+                                    </p:animMotion>
+                                  </p:childTnLst>
+                                </p:cTn>
+                              </p:par>
+                            </p:childTnLst>
+                          </p:cTn>
+                        </p:par>
+                      </p:childTnLst>
+                    </p:cTn>
+                  </p:par>
+                  <p:par>
+                    <p:cTn id="21" fill="hold">
+                      <p:stCondLst>
+                        <p:cond delay="indefinite"/>
+                      </p:stCondLst>
+                      <p:childTnLst>
+                        <p:par>
+                          <p:cTn id="22" fill="hold">
+                            <p:stCondLst>
+                              <p:cond delay="0"/>
+                            </p:stCondLst>
+                            <p:childTnLst>
+                              <p:par>
+                                <p:cTn id="23" presetID="42" presetClass="path" presetSubtype="0" accel="50000" decel="50000" fill="hold" nodeType="clickEffect">
+                                  <p:stCondLst>
+                                    <p:cond delay="0"/>
+                                  </p:stCondLst>
+                                  <p:childTnLst>
+                                    <p:animMotion origin="layout" path="M -0.00013 0.325 L -0.00013 0.44167 " pathEditMode="relative" rAng="0" ptsTypes="AA">
+                                      <p:cBhvr>
+                                        <p:cTn id="24" dur="2000" fill="hold"/>
+                                        <p:tgtEl>
+                                          <p:spTgt spid="6"/>
+                                        </p:tgtEl>
+                                        <p:attrNameLst>
+                                          <p:attrName>ppt_x</p:attrName>
+                                          <p:attrName>ppt_y</p:attrName>
+                                        </p:attrNameLst>
+                                      </p:cBhvr>
+                                      <p:rCtr x="0" y="5833"/>
+                                    </p:animMotion>
+                                  </p:childTnLst>
+                                </p:cTn>
+                              </p:par>
+                              <p:par>
+                                <p:cTn id="25" presetID="1" presetClass="entr" presetSubtype="0" fill="hold" grpId="0" nodeType="withEffect">
+                                  <p:stCondLst>
+                                    <p:cond delay="0"/>
+                                  </p:stCondLst>
+                                  <p:childTnLst>
+                                    <p:set>
+                                      <p:cBhvr>
+                                        <p:cTn id="26" dur="1" fill="hold">
+                                          <p:stCondLst>
+                                            <p:cond delay="0"/>
+                                          </p:stCondLst>
+                                        </p:cTn>
+                                        <p:tgtEl>
+                                          <p:spTgt spid="9"/>
+                                        </p:tgtEl>
+                                        <p:attrNameLst>
+                                          <p:attrName>style.visibility</p:attrName>
+                                        </p:attrNameLst>
+                                      </p:cBhvr>
+                                      <p:to>
+                                        <p:strVal val="visible"/>
+                                      </p:to>
+                                    </p:set>
+                                  </p:childTnLst>
+                                </p:cTn>
+                              </p:par>
+                            </p:childTnLst>
+                          </p:cTn>
+                        </p:par>
+                      </p:childTnLst>
+                    </p:cTn>
+                  </p:par>
+                  <p:par>
+                    <p:cTn id="27" fill="hold">
+                      <p:stCondLst>
+                        <p:cond delay="indefinite"/>
+                      </p:stCondLst>
+                      <p:childTnLst>
+                        <p:par>
+                          <p:cTn id="28" fill="hold">
+                            <p:stCondLst>
+                              <p:cond delay="0"/>
+                            </p:stCondLst>
+                            <p:childTnLst>
+                              <p:par>
+                                <p:cTn id="29" presetID="42" presetClass="path" presetSubtype="0" accel="50000" decel="50000" fill="hold" nodeType="clickEffect">
+                                  <p:stCondLst>
+                                    <p:cond delay="0"/>
+                                  </p:stCondLst>
+                                  <p:childTnLst>
+                                    <p:animMotion origin="layout" path="M -0.00013 0.44167 L 2.12775E-17 -3.33333E-6 " pathEditMode="relative" rAng="0" ptsTypes="AA">
+                                      <p:cBhvr>
+                                        <p:cTn id="30" dur="2000" fill="hold"/>
+                                        <p:tgtEl>
+                                          <p:spTgt spid="6"/>
+                                        </p:tgtEl>
+                                        <p:attrNameLst>
+                                          <p:attrName>ppt_x</p:attrName>
+                                          <p:attrName>ppt_y</p:attrName>
+                                        </p:attrNameLst>
+                                      </p:cBhvr>
+                                      <p:rCtr x="0" y="-21667"/>
+                                    </p:animMotion>
+                                  </p:childTnLst>
+                                </p:cTn>
+                              </p:par>
+                            </p:childTnLst>
+                          </p:cTn>
+                        </p:par>
+                      </p:childTnLst>
+                    </p:cTn>
+                  </p:par>
+                  <p:par>
+                    <p:cTn id="31" fill="hold">
+                      <p:stCondLst>
+                        <p:cond delay="indefinite"/>
+                      </p:stCondLst>
+                      <p:childTnLst>
+                        <p:par>
+                          <p:cTn id="32" fill="hold">
+                            <p:stCondLst>
+                              <p:cond delay="0"/>
+                            </p:stCondLst>
+                            <p:childTnLst>
+                              <p:par>
+                                <p:cTn id="33" presetID="42" presetClass="path" presetSubtype="0" accel="50000" decel="50000" fill="hold" nodeType="clickEffect">
+                                  <p:stCondLst>
+                                    <p:cond delay="0"/>
+                                  </p:stCondLst>
+                                  <p:childTnLst>
+                                    <p:animMotion origin="layout" path="M -2.08333E-7 5.55112E-17 L -0.00013 0.225 " pathEditMode="relative" rAng="0" ptsTypes="AA">
+                                      <p:cBhvr>
+                                        <p:cTn id="34" dur="2000" fill="hold"/>
+                                        <p:tgtEl>
+                                          <p:spTgt spid="6"/>
+                                        </p:tgtEl>
+                                        <p:attrNameLst>
+                                          <p:attrName>ppt_x</p:attrName>
+                                          <p:attrName>ppt_y</p:attrName>
+                                        </p:attrNameLst>
+                                      </p:cBhvr>
+                                      <p:rCtr x="-13" y="11250"/>
+                                    </p:animMotion>
+                                  </p:childTnLst>
+                                </p:cTn>
+                              </p:par>
+                            </p:childTnLst>
+                          </p:cTn>
+                        </p:par>
+                      </p:childTnLst>
+                    </p:cTn>
+                  </p:par>
+                  <p:par>
+                    <p:cTn id="35" fill="hold">
+                      <p:stCondLst>
+                        <p:cond delay="indefinite"/>
+                      </p:stCondLst>
+                      <p:childTnLst>
+                        <p:par>
+                          <p:cTn id="36" fill="hold">
+                            <p:stCondLst>
+                              <p:cond delay="0"/>
+                            </p:stCondLst>
+                            <p:childTnLst>
+                              <p:par>
+                                <p:cTn id="37" presetID="42" presetClass="path" presetSubtype="0" accel="50000" decel="50000" fill="hold" nodeType="clickEffect">
+                                  <p:stCondLst>
+                                    <p:cond delay="0"/>
+                                  </p:stCondLst>
+                                  <p:childTnLst>
+                                    <p:animMotion origin="layout" path="M -0.00013 0.225 L -0.00013 0.325 " pathEditMode="relative" rAng="0" ptsTypes="AA">
+                                      <p:cBhvr>
+                                        <p:cTn id="38" dur="2000" fill="hold"/>
+                                        <p:tgtEl>
+                                          <p:spTgt spid="6"/>
+                                        </p:tgtEl>
+                                        <p:attrNameLst>
+                                          <p:attrName>ppt_x</p:attrName>
+                                          <p:attrName>ppt_y</p:attrName>
+                                        </p:attrNameLst>
+                                      </p:cBhvr>
+                                      <p:rCtr x="0" y="5000"/>
+                                    </p:animMotion>
+                                  </p:childTnLst>
+                                </p:cTn>
+                              </p:par>
+                            </p:childTnLst>
+                          </p:cTn>
+                        </p:par>
+                      </p:childTnLst>
+                    </p:cTn>
+                  </p:par>
+                  <p:par>
+                    <p:cTn id="39" fill="hold">
+                      <p:stCondLst>
+                        <p:cond delay="indefinite"/>
+                      </p:stCondLst>
+                      <p:childTnLst>
+                        <p:par>
+                          <p:cTn id="40" fill="hold">
+                            <p:stCondLst>
+                              <p:cond delay="0"/>
+                            </p:stCondLst>
+                            <p:childTnLst>
+                              <p:par>
+                                <p:cTn id="41" presetID="42" presetClass="path" presetSubtype="0" accel="50000" decel="50000" fill="hold" nodeType="clickEffect">
+                                  <p:stCondLst>
+                                    <p:cond delay="0"/>
+                                  </p:stCondLst>
+                                  <p:childTnLst>
+                                    <p:animMotion origin="layout" path="M -0.00013 0.325 L -0.00013 0.44167 " pathEditMode="relative" rAng="0" ptsTypes="AA">
+                                      <p:cBhvr>
+                                        <p:cTn id="42" dur="2000" fill="hold"/>
+                                        <p:tgtEl>
+                                          <p:spTgt spid="6"/>
+                                        </p:tgtEl>
+                                        <p:attrNameLst>
+                                          <p:attrName>ppt_x</p:attrName>
+                                          <p:attrName>ppt_y</p:attrName>
+                                        </p:attrNameLst>
+                                      </p:cBhvr>
+                                      <p:rCtr x="0" y="5833"/>
+                                    </p:animMotion>
+                                  </p:childTnLst>
+                                </p:cTn>
+                              </p:par>
+                              <p:par>
+                                <p:cTn id="43" presetID="1" presetClass="entr" presetSubtype="0" fill="hold" grpId="0" nodeType="withEffect">
+                                  <p:stCondLst>
+                                    <p:cond delay="0"/>
+                                  </p:stCondLst>
+                                  <p:childTnLst>
+                                    <p:set>
+                                      <p:cBhvr>
+                                        <p:cTn id="44" dur="1" fill="hold">
+                                          <p:stCondLst>
+                                            <p:cond delay="0"/>
+                                          </p:stCondLst>
+                                        </p:cTn>
+                                        <p:tgtEl>
+                                          <p:spTgt spid="10"/>
+                                        </p:tgtEl>
+                                        <p:attrNameLst>
+                                          <p:attrName>style.visibility</p:attrName>
+                                        </p:attrNameLst>
+                                      </p:cBhvr>
+                                      <p:to>
+                                        <p:strVal val="visible"/>
+                                      </p:to>
+                                    </p:set>
+                                  </p:childTnLst>
+                                </p:cTn>
+                              </p:par>
+                            </p:childTnLst>
+                          </p:cTn>
+                        </p:par>
+                      </p:childTnLst>
+                    </p:cTn>
+                  </p:par>
+                  <p:par>
+                    <p:cTn id="45" fill="hold">
+                      <p:stCondLst>
+                        <p:cond delay="indefinite"/>
+                      </p:stCondLst>
+                      <p:childTnLst>
+                        <p:par>
+                          <p:cTn id="46" fill="hold">
+                            <p:stCondLst>
+                              <p:cond delay="0"/>
+                            </p:stCondLst>
+                            <p:childTnLst>
+                              <p:par>
+                                <p:cTn id="47" presetID="42" presetClass="path" presetSubtype="0" accel="50000" decel="50000" fill="hold" nodeType="clickEffect">
+                                  <p:stCondLst>
+                                    <p:cond delay="0"/>
+                                  </p:stCondLst>
+                                  <p:childTnLst>
+                                    <p:animMotion origin="layout" path="M -0.00013 0.44167 L 2.12775E-17 -3.33333E-6 " pathEditMode="relative" rAng="0" ptsTypes="AA">
+                                      <p:cBhvr>
+                                        <p:cTn id="48" dur="2000" fill="hold"/>
+                                        <p:tgtEl>
+                                          <p:spTgt spid="6"/>
+                                        </p:tgtEl>
+                                        <p:attrNameLst>
+                                          <p:attrName>ppt_x</p:attrName>
+                                          <p:attrName>ppt_y</p:attrName>
+                                        </p:attrNameLst>
+                                      </p:cBhvr>
+                                      <p:rCtr x="0" y="-21667"/>
+                                    </p:animMotion>
+                                  </p:childTnLst>
+                                </p:cTn>
+                              </p:par>
+                            </p:childTnLst>
+                          </p:cTn>
+                        </p:par>
+                      </p:childTnLst>
+                    </p:cTn>
+                  </p:par>
+                  <p:par>
+                    <p:cTn id="49" fill="hold">
+                      <p:stCondLst>
+                        <p:cond delay="indefinite"/>
+                      </p:stCondLst>
+                      <p:childTnLst>
+                        <p:par>
+                          <p:cTn id="50" fill="hold">
+                            <p:stCondLst>
+                              <p:cond delay="0"/>
+                            </p:stCondLst>
+                            <p:childTnLst>
+                              <p:par>
+                                <p:cTn id="51" presetID="42" presetClass="path" presetSubtype="0" accel="50000" decel="50000" fill="hold" nodeType="clickEffect">
+                                  <p:stCondLst>
+                                    <p:cond delay="0"/>
+                                  </p:stCondLst>
+                                  <p:childTnLst>
+                                    <p:animMotion origin="layout" path="M -2.08333E-7 5.55112E-17 L -0.00013 0.225 " pathEditMode="relative" rAng="0" ptsTypes="AA">
+                                      <p:cBhvr>
+                                        <p:cTn id="52" dur="2000" fill="hold"/>
+                                        <p:tgtEl>
+                                          <p:spTgt spid="6"/>
+                                        </p:tgtEl>
+                                        <p:attrNameLst>
+                                          <p:attrName>ppt_x</p:attrName>
+                                          <p:attrName>ppt_y</p:attrName>
+                                        </p:attrNameLst>
+                                      </p:cBhvr>
+                                      <p:rCtr x="-13" y="11250"/>
+                                    </p:animMotion>
+                                  </p:childTnLst>
+                                </p:cTn>
+                              </p:par>
+                            </p:childTnLst>
+                          </p:cTn>
+                        </p:par>
+                      </p:childTnLst>
+                    </p:cTn>
+                  </p:par>
+                  <p:par>
+                    <p:cTn id="53" fill="hold">
+                      <p:stCondLst>
+                        <p:cond delay="indefinite"/>
+                      </p:stCondLst>
+                      <p:childTnLst>
+                        <p:par>
+                          <p:cTn id="54" fill="hold">
+                            <p:stCondLst>
+                              <p:cond delay="0"/>
+                            </p:stCondLst>
+                            <p:childTnLst>
+                              <p:par>
+                                <p:cTn id="55" presetID="42" presetClass="path" presetSubtype="0" accel="50000" decel="50000" fill="hold" nodeType="clickEffect">
+                                  <p:stCondLst>
+                                    <p:cond delay="0"/>
+                                  </p:stCondLst>
+                                  <p:childTnLst>
+                                    <p:animMotion origin="layout" path="M -0.00013 0.225 L -0.00013 0.325 " pathEditMode="relative" rAng="0" ptsTypes="AA">
+                                      <p:cBhvr>
+                                        <p:cTn id="56" dur="2000" fill="hold"/>
+                                        <p:tgtEl>
+                                          <p:spTgt spid="6"/>
+                                        </p:tgtEl>
+                                        <p:attrNameLst>
+                                          <p:attrName>ppt_x</p:attrName>
+                                          <p:attrName>ppt_y</p:attrName>
+                                        </p:attrNameLst>
+                                      </p:cBhvr>
+                                      <p:rCtr x="0" y="5000"/>
+                                    </p:animMotion>
+                                  </p:childTnLst>
+                                </p:cTn>
+                              </p:par>
+                            </p:childTnLst>
+                          </p:cTn>
+                        </p:par>
+                      </p:childTnLst>
+                    </p:cTn>
+                  </p:par>
+                  <p:par>
+                    <p:cTn id="57" fill="hold">
+                      <p:stCondLst>
+                        <p:cond delay="indefinite"/>
+                      </p:stCondLst>
+                      <p:childTnLst>
+                        <p:par>
+                          <p:cTn id="58" fill="hold">
+                            <p:stCondLst>
+                              <p:cond delay="0"/>
+                            </p:stCondLst>
+                            <p:childTnLst>
+                              <p:par>
+                                <p:cTn id="59" presetID="42" presetClass="path" presetSubtype="0" accel="50000" decel="50000" fill="hold" nodeType="clickEffect">
+                                  <p:stCondLst>
+                                    <p:cond delay="0"/>
+                                  </p:stCondLst>
+                                  <p:childTnLst>
+                                    <p:animMotion origin="layout" path="M -0.00013 0.325 L -0.00013 0.44167 " pathEditMode="relative" rAng="0" ptsTypes="AA">
+                                      <p:cBhvr>
+                                        <p:cTn id="60" dur="2000" fill="hold"/>
+                                        <p:tgtEl>
+                                          <p:spTgt spid="6"/>
+                                        </p:tgtEl>
+                                        <p:attrNameLst>
+                                          <p:attrName>ppt_x</p:attrName>
+                                          <p:attrName>ppt_y</p:attrName>
+                                        </p:attrNameLst>
+                                      </p:cBhvr>
+                                      <p:rCtr x="0" y="5833"/>
+                                    </p:animMotion>
+                                  </p:childTnLst>
+                                </p:cTn>
+                              </p:par>
+                              <p:par>
+                                <p:cTn id="61" presetID="1" presetClass="entr" presetSubtype="0" fill="hold" grpId="0" nodeType="withEffect">
+                                  <p:stCondLst>
+                                    <p:cond delay="0"/>
+                                  </p:stCondLst>
+                                  <p:childTnLst>
+                                    <p:set>
+                                      <p:cBhvr>
+                                        <p:cTn id="62" dur="1" fill="hold">
+                                          <p:stCondLst>
+                                            <p:cond delay="0"/>
+                                          </p:stCondLst>
+                                        </p:cTn>
+                                        <p:tgtEl>
+                                          <p:spTgt spid="11"/>
+                                        </p:tgtEl>
+                                        <p:attrNameLst>
+                                          <p:attrName>style.visibility</p:attrName>
+                                        </p:attrNameLst>
+                                      </p:cBhvr>
+                                      <p:to>
+                                        <p:strVal val="visible"/>
+                                      </p:to>
+                                    </p:set>
+                                  </p:childTnLst>
+                                </p:cTn>
+                              </p:par>
+                            </p:childTnLst>
+                          </p:cTn>
+                        </p:par>
+                      </p:childTnLst>
+                    </p:cTn>
+                  </p:par>
+                  <p:par>
+                    <p:cTn id="63" fill="hold">
+                      <p:stCondLst>
+                        <p:cond delay="indefinite"/>
+                      </p:stCondLst>
+                      <p:childTnLst>
+                        <p:par>
+                          <p:cTn id="64" fill="hold">
+                            <p:stCondLst>
+                              <p:cond delay="0"/>
+                            </p:stCondLst>
+                            <p:childTnLst>
+                              <p:par>
+                                <p:cTn id="65" presetID="42" presetClass="path" presetSubtype="0" accel="50000" decel="50000" fill="hold" nodeType="clickEffect">
+                                  <p:stCondLst>
+                                    <p:cond delay="0"/>
+                                  </p:stCondLst>
+                                  <p:childTnLst>
+                                    <p:animMotion origin="layout" path="M -0.00013 0.44167 L -2.08333E-7 5.55112E-17 " pathEditMode="relative" rAng="0" ptsTypes="AA">
+                                      <p:cBhvr>
+                                        <p:cTn id="66" dur="2000" fill="hold"/>
+                                        <p:tgtEl>
+                                          <p:spTgt spid="6"/>
+                                        </p:tgtEl>
+                                        <p:attrNameLst>
+                                          <p:attrName>ppt_x</p:attrName>
+                                          <p:attrName>ppt_y</p:attrName>
+                                        </p:attrNameLst>
+                                      </p:cBhvr>
+                                      <p:rCtr x="0" y="-22083"/>
+                                    </p:animMotion>
+                                  </p:childTnLst>
+                                </p:cTn>
+                              </p:par>
+                            </p:childTnLst>
+                          </p:cTn>
+                        </p:par>
+                      </p:childTnLst>
+                    </p:cTn>
+                  </p:par>
+                  <p:par>
+                    <p:cTn id="67" fill="hold">
+                      <p:stCondLst>
+                        <p:cond delay="indefinite"/>
+                      </p:stCondLst>
+                      <p:childTnLst>
+                        <p:par>
+                          <p:cTn id="68" fill="hold">
+                            <p:stCondLst>
+                              <p:cond delay="0"/>
+                            </p:stCondLst>
+                            <p:childTnLst>
+                              <p:par>
+                                <p:cTn id="69" presetID="42" presetClass="path" presetSubtype="0" accel="50000" decel="50000" fill="hold" nodeType="clickEffect">
+                                  <p:stCondLst>
+                                    <p:cond delay="0"/>
+                                  </p:stCondLst>
+                                  <p:childTnLst>
+                                    <p:animMotion origin="layout" path="M -2.08333E-7 5.55112E-17 L -0.00013 0.225 " pathEditMode="relative" rAng="0" ptsTypes="AA">
+                                      <p:cBhvr>
+                                        <p:cTn id="70" dur="2000" fill="hold"/>
+                                        <p:tgtEl>
+                                          <p:spTgt spid="6"/>
+                                        </p:tgtEl>
+                                        <p:attrNameLst>
+                                          <p:attrName>ppt_x</p:attrName>
+                                          <p:attrName>ppt_y</p:attrName>
+                                        </p:attrNameLst>
+                                      </p:cBhvr>
+                                      <p:rCtr x="-13" y="11250"/>
+                                    </p:animMotion>
+                                  </p:childTnLst>
+                                </p:cTn>
+                              </p:par>
+                            </p:childTnLst>
+                          </p:cTn>
+                        </p:par>
+                      </p:childTnLst>
+                    </p:cTn>
+                  </p:par>
+                  <p:par>
+                    <p:cTn id="71" fill="hold">
+                      <p:stCondLst>
+                        <p:cond delay="indefinite"/>
+                      </p:stCondLst>
+                      <p:childTnLst>
+                        <p:par>
+                          <p:cTn id="72" fill="hold">
+                            <p:stCondLst>
+                              <p:cond delay="0"/>
+                            </p:stCondLst>
+                            <p:childTnLst>
+                              <p:par>
+                                <p:cTn id="73" presetID="42" presetClass="path" presetSubtype="0" accel="50000" decel="50000" fill="hold" nodeType="clickEffect">
+                                  <p:stCondLst>
+                                    <p:cond delay="0"/>
+                                  </p:stCondLst>
+                                  <p:childTnLst>
+                                    <p:animMotion origin="layout" path="M -0.00013 0.225 L -0.00013 0.325 " pathEditMode="relative" rAng="0" ptsTypes="AA">
+                                      <p:cBhvr>
+                                        <p:cTn id="74" dur="2000" fill="hold"/>
+                                        <p:tgtEl>
+                                          <p:spTgt spid="6"/>
+                                        </p:tgtEl>
+                                        <p:attrNameLst>
+                                          <p:attrName>ppt_x</p:attrName>
+                                          <p:attrName>ppt_y</p:attrName>
+                                        </p:attrNameLst>
+                                      </p:cBhvr>
+                                      <p:rCtr x="0" y="5000"/>
+                                    </p:animMotion>
+                                  </p:childTnLst>
+                                </p:cTn>
+                              </p:par>
+                            </p:childTnLst>
+                          </p:cTn>
+                        </p:par>
+                      </p:childTnLst>
+                    </p:cTn>
+                  </p:par>
+                  <p:par>
+                    <p:cTn id="75" fill="hold">
+                      <p:stCondLst>
+                        <p:cond delay="indefinite"/>
+                      </p:stCondLst>
+                      <p:childTnLst>
+                        <p:par>
+                          <p:cTn id="76" fill="hold">
+                            <p:stCondLst>
+                              <p:cond delay="0"/>
+                            </p:stCondLst>
+                            <p:childTnLst>
+                              <p:par>
+                                <p:cTn id="77" presetID="42" presetClass="path" presetSubtype="0" accel="50000" decel="50000" fill="hold" nodeType="clickEffect">
+                                  <p:stCondLst>
+                                    <p:cond delay="0"/>
+                                  </p:stCondLst>
+                                  <p:childTnLst>
+                                    <p:animMotion origin="layout" path="M -0.00013 0.325 L -0.00013 0.44167 " pathEditMode="relative" rAng="0" ptsTypes="AA">
+                                      <p:cBhvr>
+                                        <p:cTn id="78" dur="2000" fill="hold"/>
+                                        <p:tgtEl>
+                                          <p:spTgt spid="6"/>
+                                        </p:tgtEl>
+                                        <p:attrNameLst>
+                                          <p:attrName>ppt_x</p:attrName>
+                                          <p:attrName>ppt_y</p:attrName>
+                                        </p:attrNameLst>
+                                      </p:cBhvr>
+                                      <p:rCtr x="0" y="5833"/>
+                                    </p:animMotion>
+                                  </p:childTnLst>
+                                </p:cTn>
+                              </p:par>
+                              <p:par>
+                                <p:cTn id="79" presetID="1" presetClass="entr" presetSubtype="0" fill="hold" grpId="0" nodeType="withEffect">
+                                  <p:stCondLst>
+                                    <p:cond delay="0"/>
+                                  </p:stCondLst>
+                                  <p:childTnLst>
+                                    <p:set>
+                                      <p:cBhvr>
+                                        <p:cTn id="80" dur="1" fill="hold">
+                                          <p:stCondLst>
+                                            <p:cond delay="0"/>
+                                          </p:stCondLst>
+                                        </p:cTn>
+                                        <p:tgtEl>
+                                          <p:spTgt spid="12"/>
+                                        </p:tgtEl>
+                                        <p:attrNameLst>
+                                          <p:attrName>style.visibility</p:attrName>
+                                        </p:attrNameLst>
+                                      </p:cBhvr>
+                                      <p:to>
+                                        <p:strVal val="visible"/>
+                                      </p:to>
+                                    </p:set>
+                                  </p:childTnLst>
+                                </p:cTn>
+                              </p:par>
+                            </p:childTnLst>
+                          </p:cTn>
+                        </p:par>
+                      </p:childTnLst>
+                    </p:cTn>
+                  </p:par>
+                  <p:par>
+                    <p:cTn id="81" fill="hold">
+                      <p:stCondLst>
+                        <p:cond delay="indefinite"/>
+                      </p:stCondLst>
+                      <p:childTnLst>
+                        <p:par>
+                          <p:cTn id="82" fill="hold">
+                            <p:stCondLst>
+                              <p:cond delay="0"/>
+                            </p:stCondLst>
+                            <p:childTnLst>
+                              <p:par>
+                                <p:cTn id="83" presetID="42" presetClass="path" presetSubtype="0" accel="50000" decel="50000" fill="hold" nodeType="clickEffect">
+                                  <p:stCondLst>
+                                    <p:cond delay="0"/>
+                                  </p:stCondLst>
+                                  <p:childTnLst>
+                                    <p:animMotion origin="layout" path="M -0.00013 0.44167 L 2.12775E-17 3.33333E-6 " pathEditMode="relative" rAng="0" ptsTypes="AA">
+                                      <p:cBhvr>
+                                        <p:cTn id="84" dur="2000" fill="hold"/>
+                                        <p:tgtEl>
+                                          <p:spTgt spid="6"/>
+                                        </p:tgtEl>
+                                        <p:attrNameLst>
+                                          <p:attrName>ppt_x</p:attrName>
+                                          <p:attrName>ppt_y</p:attrName>
+                                        </p:attrNameLst>
+                                      </p:cBhvr>
+                                      <p:rCtr x="0" y="-22500"/>
+                                    </p:animMotion>
+                                  </p:childTnLst>
+                                </p:cTn>
+                              </p:par>
+                            </p:childTnLst>
+                          </p:cTn>
+                        </p:par>
+                      </p:childTnLst>
+                    </p:cTn>
+                  </p:par>
+                  <p:par>
+                    <p:cTn id="85" fill="hold">
+                      <p:stCondLst>
+                        <p:cond delay="indefinite"/>
+                      </p:stCondLst>
+                      <p:childTnLst>
+                        <p:par>
+                          <p:cTn id="86" fill="hold">
+                            <p:stCondLst>
+                              <p:cond delay="0"/>
+                            </p:stCondLst>
+                            <p:childTnLst>
+                              <p:par>
+                                <p:cTn id="87" presetID="42" presetClass="path" presetSubtype="0" accel="50000" decel="50000" fill="hold" nodeType="clickEffect">
+                                  <p:stCondLst>
+                                    <p:cond delay="0"/>
+                                  </p:stCondLst>
+                                  <p:childTnLst>
+                                    <p:animMotion origin="layout" path="M -2.08333E-7 5.55112E-17 L -0.00013 0.225 " pathEditMode="relative" rAng="0" ptsTypes="AA">
+                                      <p:cBhvr>
+                                        <p:cTn id="88" dur="2000" fill="hold"/>
+                                        <p:tgtEl>
+                                          <p:spTgt spid="6"/>
+                                        </p:tgtEl>
+                                        <p:attrNameLst>
+                                          <p:attrName>ppt_x</p:attrName>
+                                          <p:attrName>ppt_y</p:attrName>
+                                        </p:attrNameLst>
+                                      </p:cBhvr>
+                                      <p:rCtr x="-13" y="11250"/>
+                                    </p:animMotion>
+                                  </p:childTnLst>
+                                </p:cTn>
+                              </p:par>
+                            </p:childTnLst>
+                          </p:cTn>
+                        </p:par>
+                      </p:childTnLst>
+                    </p:cTn>
+                  </p:par>
+                  <p:par>
+                    <p:cTn id="89" fill="hold">
+                      <p:stCondLst>
+                        <p:cond delay="indefinite"/>
+                      </p:stCondLst>
+                      <p:childTnLst>
+                        <p:par>
+                          <p:cTn id="90" fill="hold">
+                            <p:stCondLst>
+                              <p:cond delay="0"/>
+                            </p:stCondLst>
+                            <p:childTnLst>
+                              <p:par>
+                                <p:cTn id="91" presetID="42" presetClass="path" presetSubtype="0" accel="50000" decel="50000" fill="hold" nodeType="clickEffect">
+                                  <p:stCondLst>
+                                    <p:cond delay="0"/>
+                                  </p:stCondLst>
+                                  <p:childTnLst>
+                                    <p:animMotion origin="layout" path="M -0.00013 0.225 L -0.00013 0.325 " pathEditMode="relative" rAng="0" ptsTypes="AA">
+                                      <p:cBhvr>
+                                        <p:cTn id="92" dur="2000" fill="hold"/>
+                                        <p:tgtEl>
+                                          <p:spTgt spid="6"/>
+                                        </p:tgtEl>
+                                        <p:attrNameLst>
+                                          <p:attrName>ppt_x</p:attrName>
+                                          <p:attrName>ppt_y</p:attrName>
+                                        </p:attrNameLst>
+                                      </p:cBhvr>
+                                      <p:rCtr x="0" y="5000"/>
+                                    </p:animMotion>
+                                  </p:childTnLst>
+                                </p:cTn>
+                              </p:par>
+                            </p:childTnLst>
+                          </p:cTn>
+                        </p:par>
+                      </p:childTnLst>
+                    </p:cTn>
+                  </p:par>
+                  <p:par>
+                    <p:cTn id="93" fill="hold">
+                      <p:stCondLst>
+                        <p:cond delay="indefinite"/>
+                      </p:stCondLst>
+                      <p:childTnLst>
+                        <p:par>
+                          <p:cTn id="94" fill="hold">
+                            <p:stCondLst>
+                              <p:cond delay="0"/>
+                            </p:stCondLst>
+                            <p:childTnLst>
+                              <p:par>
+                                <p:cTn id="95" presetID="42" presetClass="path" presetSubtype="0" accel="50000" decel="50000" fill="hold" nodeType="clickEffect">
+                                  <p:stCondLst>
+                                    <p:cond delay="0"/>
+                                  </p:stCondLst>
+                                  <p:childTnLst>
+                                    <p:animMotion origin="layout" path="M -0.00013 0.325 L -0.00013 0.44167 " pathEditMode="relative" rAng="0" ptsTypes="AA">
+                                      <p:cBhvr>
+                                        <p:cTn id="96" dur="2000" fill="hold"/>
+                                        <p:tgtEl>
+                                          <p:spTgt spid="6"/>
+                                        </p:tgtEl>
+                                        <p:attrNameLst>
+                                          <p:attrName>ppt_x</p:attrName>
+                                          <p:attrName>ppt_y</p:attrName>
+                                        </p:attrNameLst>
+                                      </p:cBhvr>
+                                      <p:rCtr x="0" y="5833"/>
+                                    </p:animMotion>
+                                  </p:childTnLst>
+                                </p:cTn>
+                              </p:par>
+                            </p:childTnLst>
+                          </p:cTn>
+                        </p:par>
+                        <p:par>
+                          <p:cTn id="97" fill="hold">
+                            <p:stCondLst>
+                              <p:cond delay="2000"/>
+                            </p:stCondLst>
+                            <p:childTnLst>
+                              <p:par>
+                                <p:cTn id="98" presetID="1" presetClass="entr" presetSubtype="0" fill="hold" grpId="0" nodeType="afterEffect">
+                                  <p:stCondLst>
+                                    <p:cond delay="0"/>
+                                  </p:stCondLst>
+                                  <p:childTnLst>
+                                    <p:set>
+                                      <p:cBhvr>
+                                        <p:cTn id="99" dur="1" fill="hold">
+                                          <p:stCondLst>
+                                            <p:cond delay="0"/>
+                                          </p:stCondLst>
+                                        </p:cTn>
+                                        <p:tgtEl>
+                                          <p:spTgt spid="13"/>
+                                        </p:tgtEl>
+                                        <p:attrNameLst>
+                                          <p:attrName>style.visibility</p:attrName>
+                                        </p:attrNameLst>
+                                      </p:cBhvr>
+                                      <p:to>
+                                        <p:strVal val="visible"/>
+                                      </p:to>
+                                    </p:set>
+                                  </p:childTnLst>
+                                </p:cTn>
+                              </p:par>
+                            </p:childTnLst>
+                          </p:cTn>
+                        </p:par>
+                      </p:childTnLst>
+                    </p:cTn>
+                  </p:par>
+                  <p:par>
+                    <p:cTn id="100" fill="hold">
+                      <p:stCondLst>
+                        <p:cond delay="indefinite"/>
+                      </p:stCondLst>
+                      <p:childTnLst>
+                        <p:par>
+                          <p:cTn id="101" fill="hold">
+                            <p:stCondLst>
+                              <p:cond delay="0"/>
+                            </p:stCondLst>
+                            <p:childTnLst>
+                              <p:par>
+                                <p:cTn id="102" presetID="42" presetClass="path" presetSubtype="0" accel="50000" decel="50000" fill="hold" nodeType="clickEffect">
+                                  <p:stCondLst>
+                                    <p:cond delay="0"/>
+                                  </p:stCondLst>
+                                  <p:childTnLst>
+                                    <p:animMotion origin="layout" path="M -0.00013 0.44167 L 2.12775E-17 -3.33333E-6 " pathEditMode="relative" rAng="0" ptsTypes="AA">
+                                      <p:cBhvr>
+                                        <p:cTn id="103" dur="2000" fill="hold"/>
+                                        <p:tgtEl>
+                                          <p:spTgt spid="6"/>
+                                        </p:tgtEl>
+                                        <p:attrNameLst>
+                                          <p:attrName>ppt_x</p:attrName>
+                                          <p:attrName>ppt_y</p:attrName>
+                                        </p:attrNameLst>
+                                      </p:cBhvr>
+                                      <p:rCtr x="0" y="-21667"/>
+                                    </p:animMotion>
+                                  </p:childTnLst>
+                                </p:cTn>
+                              </p:par>
+                            </p:childTnLst>
+                          </p:cTn>
+                        </p:par>
+                      </p:childTnLst>
+                    </p:cTn>
+                  </p:par>
+                  <p:par>
+                    <p:cTn id="104" fill="hold">
+                      <p:stCondLst>
+                        <p:cond delay="indefinite"/>
+                      </p:stCondLst>
+                      <p:childTnLst>
+                        <p:par>
+                          <p:cTn id="105" fill="hold">
+                            <p:stCondLst>
+                              <p:cond delay="0"/>
+                            </p:stCondLst>
+                            <p:childTnLst>
+                              <p:par>
+                                <p:cTn id="106" presetID="1" presetClass="exit" presetSubtype="0" fill="hold" nodeType="clickEffect">
+                                  <p:stCondLst>
+                                    <p:cond delay="0"/>
+                                  </p:stCondLst>
+                                  <p:childTnLst>
+                                    <p:set>
+                                      <p:cBhvr>
+                                        <p:cTn id="107" dur="1" fill="hold">
+                                          <p:stCondLst>
+                                            <p:cond delay="0"/>
+                                          </p:stCondLst>
+                                        </p:cTn>
+                                        <p:tgtEl>
+                                          <p:spTgt spid="6"/>
+                                        </p:tgtEl>
+                                        <p:attrNameLst>
+                                          <p:attrName>style.visibility</p:attrName>
+                                        </p:attrNameLst>
+                                      </p:cBhvr>
+                                      <p:to>
+                                        <p:strVal val="hidden"/>
+                                      </p:to>
+                                    </p:set>
+                                  </p:childTnLst>
+                                </p:cTn>
+                              </p:par>
+                            </p:childTnLst>
+                          </p:cTn>
+                        </p:par>
+                      </p:childTnLst>
+                    </p:cTn>
+                  </p:par>
+                  <p:par>
+                    <p:cTn id="108" fill="hold">
+                      <p:stCondLst>
+                        <p:cond delay="indefinite"/>
+                      </p:stCondLst>
+                      <p:childTnLst>
+                        <p:par>
+                          <p:cTn id="109" fill="hold">
+                            <p:stCondLst>
+                              <p:cond delay="0"/>
+                            </p:stCondLst>
+                            <p:childTnLst>
+                              <p:par>
+                                <p:cTn id="110" presetID="1" presetClass="entr" presetSubtype="0" fill="hold" nodeType="clickEffect">
+                                  <p:stCondLst>
+                                    <p:cond delay="0"/>
+                                  </p:stCondLst>
+                                  <p:childTnLst>
+                                    <p:set>
+                                      <p:cBhvr>
+                                        <p:cTn id="111" dur="1" fill="hold">
+                                          <p:stCondLst>
+                                            <p:cond delay="0"/>
+                                          </p:stCondLst>
+                                        </p:cTn>
+                                        <p:tgtEl>
+                                          <p:spTgt spid="15"/>
+                                        </p:tgtEl>
+                                        <p:attrNameLst>
+                                          <p:attrName>style.visibility</p:attrName>
+                                        </p:attrNameLst>
+                                      </p:cBhvr>
+                                      <p:to>
+                                        <p:strVal val="visible"/>
+                                      </p:to>
+                                    </p:set>
+                                  </p:childTnLst>
+                                </p:cTn>
+                              </p:par>
+                            </p:childTnLst>
+                          </p:cTn>
+                        </p:par>
+                      </p:childTnLst>
+                    </p:cTn>
+                  </p:par>
+                </p:childTnLst>
+              </p:cTn>
+              <p:prevCondLst>
+                <p:cond evt="onPrev" delay="0">
+                  <p:tgtEl>
+                    <p:sldTgt/>
+                  </p:tgtEl>
+                </p:cond>
+              </p:prevCondLst>
+              <p:nextCondLst>
+                <p:cond evt="onNext" delay="0">
+                  <p:tgtEl>
+                    <p:sldTgt/>
+                  </p:tgtEl>
+                </p:cond>
+              </p:nextCondLst>
+            </p:seq>
+          </p:childTnLst>
+        </p:cTn>
       </p:par>
     </p:tnLst>
+    <p:bldLst>
+      <p:bldP spid="7" grpId="0" animBg="1"/>
+      <p:bldP spid="8" grpId="0" animBg="1"/>
+      <p:bldP spid="9" grpId="0" animBg="1"/>
+      <p:bldP spid="10" grpId="0" animBg="1"/>
+      <p:bldP spid="11" grpId="0" animBg="1"/>
+      <p:bldP spid="12" grpId="0" animBg="1"/>
+      <p:bldP spid="13" grpId="0" animBg="1"/>
+    </p:bldLst>
   </p:timing>
 </p:sld>
 </file>

</xml_diff>

<commit_message>
add while loops basic practice
</commit_message>
<xml_diff>
--- a/WhileLoops/WhileLoops.pptx
+++ b/WhileLoops/WhileLoops.pptx
@@ -215,7 +215,7 @@
           <a:p>
             <a:fld id="{19104133-B5B0-4351-8158-4F0E5EB1E2BF}" type="datetimeFigureOut">
               <a:rPr lang="en-US" smtClean="0"/>
-              <a:t>10/22/2020</a:t>
+              <a:t>2/4/2021</a:t>
             </a:fld>
             <a:endParaRPr lang="en-US"/>
           </a:p>
@@ -279,38 +279,37 @@
           <a:p>
             <a:pPr lvl="0"/>
             <a:r>
-              <a:rPr lang="en-US" smtClean="0"/>
+              <a:rPr lang="en-US"/>
               <a:t>Edit Master text styles</a:t>
             </a:r>
           </a:p>
           <a:p>
             <a:pPr lvl="1"/>
             <a:r>
-              <a:rPr lang="en-US" smtClean="0"/>
+              <a:rPr lang="en-US"/>
               <a:t>Second level</a:t>
             </a:r>
           </a:p>
           <a:p>
             <a:pPr lvl="2"/>
             <a:r>
-              <a:rPr lang="en-US" smtClean="0"/>
+              <a:rPr lang="en-US"/>
               <a:t>Third level</a:t>
             </a:r>
           </a:p>
           <a:p>
             <a:pPr lvl="3"/>
             <a:r>
-              <a:rPr lang="en-US" smtClean="0"/>
+              <a:rPr lang="en-US"/>
               <a:t>Fourth level</a:t>
             </a:r>
           </a:p>
           <a:p>
             <a:pPr lvl="4"/>
             <a:r>
-              <a:rPr lang="en-US" smtClean="0"/>
+              <a:rPr lang="en-US"/>
               <a:t>Fifth level</a:t>
             </a:r>
-            <a:endParaRPr lang="en-US"/>
           </a:p>
         </p:txBody>
       </p:sp>
@@ -528,19 +527,19 @@
           <a:lstStyle/>
           <a:p>
             <a:r>
-              <a:rPr lang="en-US" dirty="0" smtClean="0"/>
+              <a:rPr lang="en-US" dirty="0"/>
               <a:t>Introduce while loops. They repeat</a:t>
             </a:r>
             <a:r>
-              <a:rPr lang="en-US" baseline="0" dirty="0" smtClean="0"/>
+              <a:rPr lang="en-US" baseline="0" dirty="0"/>
               <a:t> the code within the curly brackets as long as </a:t>
             </a:r>
             <a:r>
-              <a:rPr lang="en-US" i="1" baseline="0" dirty="0" smtClean="0"/>
+              <a:rPr lang="en-US" i="1" baseline="0" dirty="0"/>
               <a:t>condition</a:t>
             </a:r>
             <a:r>
-              <a:rPr lang="en-US" i="0" baseline="0" dirty="0" smtClean="0"/>
+              <a:rPr lang="en-US" i="0" baseline="0" dirty="0"/>
               <a:t> is true.</a:t>
             </a:r>
             <a:endParaRPr lang="en-US" dirty="0"/>
@@ -628,10 +627,9 @@
           <a:lstStyle/>
           <a:p>
             <a:r>
-              <a:rPr lang="en-US" dirty="0" smtClean="0"/>
+              <a:rPr lang="en-US" dirty="0"/>
               <a:t>Ask this question to a student.</a:t>
             </a:r>
-            <a:endParaRPr lang="en-US" dirty="0"/>
           </a:p>
         </p:txBody>
       </p:sp>
@@ -716,35 +714,35 @@
           <a:lstStyle/>
           <a:p>
             <a:r>
-              <a:rPr lang="en-US" dirty="0" smtClean="0"/>
+              <a:rPr lang="en-US" dirty="0"/>
               <a:t>Show</a:t>
             </a:r>
             <a:r>
-              <a:rPr lang="en-US" baseline="0" dirty="0" smtClean="0"/>
+              <a:rPr lang="en-US" baseline="0" dirty="0"/>
               <a:t> the flowchart. Explain how the while loop repeats (or not) based on the </a:t>
             </a:r>
             <a:r>
-              <a:rPr lang="en-US" i="1" baseline="0" dirty="0" err="1" smtClean="0"/>
+              <a:rPr lang="en-US" i="1" baseline="0" dirty="0" err="1"/>
               <a:t>boolean_expression</a:t>
             </a:r>
             <a:r>
-              <a:rPr lang="en-US" baseline="0" dirty="0" smtClean="0"/>
+              <a:rPr lang="en-US" baseline="0" dirty="0"/>
               <a:t>. The only way to exit the while loop is for the </a:t>
             </a:r>
             <a:r>
-              <a:rPr lang="en-US" i="1" baseline="0" dirty="0" err="1" smtClean="0"/>
+              <a:rPr lang="en-US" i="1" baseline="0" dirty="0" err="1"/>
               <a:t>boolean_expression</a:t>
             </a:r>
             <a:r>
-              <a:rPr lang="en-US" baseline="0" dirty="0" smtClean="0"/>
+              <a:rPr lang="en-US" baseline="0" dirty="0"/>
               <a:t> to become </a:t>
             </a:r>
             <a:r>
-              <a:rPr lang="en-US" b="1" baseline="0" dirty="0" smtClean="0"/>
+              <a:rPr lang="en-US" b="1" baseline="0" dirty="0"/>
               <a:t>false</a:t>
             </a:r>
             <a:r>
-              <a:rPr lang="en-US" baseline="0" dirty="0" smtClean="0"/>
+              <a:rPr lang="en-US" baseline="0" dirty="0"/>
               <a:t>.</a:t>
             </a:r>
             <a:endParaRPr lang="en-US" dirty="0"/>
@@ -849,19 +847,19 @@
               <a:defRPr/>
             </a:pPr>
             <a:r>
-              <a:rPr lang="en-US" sz="1200" dirty="0" smtClean="0"/>
+              <a:rPr lang="en-US" sz="1200" dirty="0"/>
               <a:t>Write out this example on the whiteboard, keeping track of the </a:t>
             </a:r>
             <a:r>
-              <a:rPr lang="en-US" sz="1200" b="1" dirty="0" smtClean="0"/>
+              <a:rPr lang="en-US" sz="1200" b="1" dirty="0"/>
               <a:t>count</a:t>
             </a:r>
             <a:r>
-              <a:rPr lang="en-US" sz="1200" dirty="0" smtClean="0"/>
+              <a:rPr lang="en-US" sz="1200" dirty="0"/>
               <a:t> variable and the output.</a:t>
             </a:r>
             <a:r>
-              <a:rPr lang="en-US" sz="1200" baseline="0" dirty="0" smtClean="0"/>
+              <a:rPr lang="en-US" sz="1200" baseline="0" dirty="0"/>
               <a:t> Allow the students to help step through each line of the code.</a:t>
             </a:r>
           </a:p>
@@ -883,7 +881,7 @@
               <a:tabLst/>
               <a:defRPr/>
             </a:pPr>
-            <a:endParaRPr lang="en-US" sz="1200" baseline="0" dirty="0" smtClean="0"/>
+            <a:endParaRPr lang="en-US" sz="1200" baseline="0" dirty="0"/>
           </a:p>
           <a:p>
             <a:pPr marL="0" marR="0" lvl="0" indent="0" algn="l" defTabSz="914400" rtl="0" eaLnBrk="1" fontAlgn="auto" latinLnBrk="0" hangingPunct="1">
@@ -904,26 +902,26 @@
               <a:defRPr/>
             </a:pPr>
             <a:r>
-              <a:rPr lang="en-US" sz="1200" baseline="0" dirty="0" smtClean="0"/>
+              <a:rPr lang="en-US" sz="1200" baseline="0" dirty="0"/>
               <a:t>Show how each time through the loop, the computer checks the condition. If the condition is </a:t>
             </a:r>
             <a:r>
-              <a:rPr lang="en-US" sz="1200" b="1" baseline="0" dirty="0" smtClean="0"/>
+              <a:rPr lang="en-US" sz="1200" b="1" baseline="0" dirty="0"/>
               <a:t>true</a:t>
             </a:r>
             <a:r>
-              <a:rPr lang="en-US" sz="1200" baseline="0" dirty="0" smtClean="0"/>
+              <a:rPr lang="en-US" sz="1200" baseline="0" dirty="0"/>
               <a:t>, it enters the body of the loop. If the condition is </a:t>
             </a:r>
             <a:r>
-              <a:rPr lang="en-US" sz="1200" b="1" baseline="0" dirty="0" smtClean="0"/>
+              <a:rPr lang="en-US" sz="1200" b="1" baseline="0" dirty="0"/>
               <a:t>false</a:t>
             </a:r>
             <a:r>
-              <a:rPr lang="en-US" sz="1200" b="0" baseline="0" dirty="0" smtClean="0"/>
+              <a:rPr lang="en-US" sz="1200" b="0" baseline="0" dirty="0"/>
               <a:t>, it exits the loop.</a:t>
             </a:r>
-            <a:endParaRPr lang="en-US" sz="1200" b="1" dirty="0" smtClean="0"/>
+            <a:endParaRPr lang="en-US" sz="1200" b="1" dirty="0"/>
           </a:p>
         </p:txBody>
       </p:sp>
@@ -1008,11 +1006,11 @@
           <a:lstStyle/>
           <a:p>
             <a:r>
-              <a:rPr lang="en-US" dirty="0" smtClean="0"/>
+              <a:rPr lang="en-US" dirty="0"/>
               <a:t>Ask this question to a student. If the code runs, there will be an infinite</a:t>
             </a:r>
             <a:r>
-              <a:rPr lang="en-US" baseline="0" dirty="0" smtClean="0"/>
+              <a:rPr lang="en-US" baseline="0" dirty="0"/>
               <a:t> loop!</a:t>
             </a:r>
             <a:endParaRPr lang="en-US" dirty="0"/>
@@ -1100,15 +1098,15 @@
           <a:lstStyle/>
           <a:p>
             <a:r>
-              <a:rPr lang="en-US" dirty="0" smtClean="0"/>
+              <a:rPr lang="en-US" dirty="0"/>
               <a:t>Open the REPL to see an example of a </a:t>
             </a:r>
             <a:r>
-              <a:rPr lang="en-US" b="1" dirty="0" smtClean="0"/>
+              <a:rPr lang="en-US" b="1" dirty="0"/>
               <a:t>while</a:t>
             </a:r>
             <a:r>
-              <a:rPr lang="en-US" b="0" dirty="0" smtClean="0"/>
+              <a:rPr lang="en-US" b="0" dirty="0"/>
               <a:t> loop in action</a:t>
             </a:r>
             <a:endParaRPr lang="en-US" dirty="0"/>
@@ -1291,15 +1289,7 @@
           <a:p>
             <a:r>
               <a:rPr lang="en-US" dirty="0"/>
-              <a:t>Click to edit Master </a:t>
-            </a:r>
-            <a:r>
-              <a:rPr lang="en-US" dirty="0" smtClean="0"/>
-              <a:t>subtitle </a:t>
-            </a:r>
-            <a:r>
-              <a:rPr lang="en-US" dirty="0"/>
-              <a:t>style</a:t>
+              <a:t>Click to edit Master subtitle style</a:t>
             </a:r>
           </a:p>
         </p:txBody>
@@ -1341,7 +1331,7 @@
             <a:fld id="{1C2D31DE-C454-491C-B5C3-F097855E3DF7}" type="datetime4">
               <a:rPr lang="en-US" smtClean="0"/>
               <a:pPr/>
-              <a:t>October 22, 2020</a:t>
+              <a:t>February 4, 2021</a:t>
             </a:fld>
             <a:endParaRPr lang="en-US" dirty="0"/>
           </a:p>
@@ -4415,17 +4405,16 @@
           <a:p>
             <a:pPr lvl="0"/>
             <a:r>
-              <a:rPr lang="en-US" dirty="0" smtClean="0"/>
+              <a:rPr lang="en-US" dirty="0"/>
               <a:t>Presenter Name</a:t>
             </a:r>
             <a:br>
-              <a:rPr lang="en-US" dirty="0" smtClean="0"/>
+              <a:rPr lang="en-US" dirty="0"/>
             </a:br>
             <a:r>
-              <a:rPr lang="en-US" dirty="0" smtClean="0"/>
+              <a:rPr lang="en-US" dirty="0"/>
               <a:t>Presenter Title</a:t>
             </a:r>
-            <a:endParaRPr lang="en-US" dirty="0"/>
           </a:p>
         </p:txBody>
       </p:sp>
@@ -4442,13 +4431,6 @@
   <p:transition>
     <p:fade/>
   </p:transition>
-  <p:timing>
-    <p:tnLst>
-      <p:par>
-        <p:cTn id="1" dur="indefinite" restart="never" nodeType="tmRoot"/>
-      </p:par>
-    </p:tnLst>
-  </p:timing>
   <p:hf sldNum="0" hdr="0" ftr="0"/>
 </p:sldLayout>
 </file>
@@ -4741,7 +4723,7 @@
           <a:p>
             <a:fld id="{5958763E-B898-436D-883D-03711491D54A}" type="datetimeFigureOut">
               <a:rPr lang="en-US" smtClean="0"/>
-              <a:t>10/22/2020</a:t>
+              <a:t>2/4/2021</a:t>
             </a:fld>
             <a:endParaRPr lang="en-US"/>
           </a:p>
@@ -4814,13 +4796,6 @@
   <p:transition>
     <p:fade/>
   </p:transition>
-  <p:timing>
-    <p:tnLst>
-      <p:par>
-        <p:cTn id="1" dur="indefinite" restart="never" nodeType="tmRoot"/>
-      </p:par>
-    </p:tnLst>
-  </p:timing>
 </p:sldLayout>
 </file>
 
@@ -4869,10 +4844,9 @@
           </a:lstStyle>
           <a:p>
             <a:r>
-              <a:rPr lang="en-US" dirty="0" smtClean="0"/>
+              <a:rPr lang="en-US" dirty="0"/>
               <a:t>Click icon to add picture</a:t>
             </a:r>
-            <a:endParaRPr lang="en-US" dirty="0"/>
           </a:p>
         </p:txBody>
       </p:sp>
@@ -4942,7 +4916,7 @@
           <a:p>
             <a:fld id="{5958763E-B898-436D-883D-03711491D54A}" type="datetimeFigureOut">
               <a:rPr lang="en-US" smtClean="0"/>
-              <a:t>10/22/2020</a:t>
+              <a:t>2/4/2021</a:t>
             </a:fld>
             <a:endParaRPr lang="en-US"/>
           </a:p>
@@ -5015,13 +4989,6 @@
   <p:transition>
     <p:fade/>
   </p:transition>
-  <p:timing>
-    <p:tnLst>
-      <p:par>
-        <p:cTn id="1" dur="indefinite" restart="never" nodeType="tmRoot"/>
-      </p:par>
-    </p:tnLst>
-  </p:timing>
 </p:sldLayout>
 </file>
 
@@ -5199,7 +5166,7 @@
           <a:p>
             <a:fld id="{5958763E-B898-436D-883D-03711491D54A}" type="datetimeFigureOut">
               <a:rPr lang="en-US" smtClean="0"/>
-              <a:t>10/22/2020</a:t>
+              <a:t>2/4/2021</a:t>
             </a:fld>
             <a:endParaRPr lang="en-US"/>
           </a:p>
@@ -5272,13 +5239,6 @@
   <p:transition>
     <p:fade/>
   </p:transition>
-  <p:timing>
-    <p:tnLst>
-      <p:par>
-        <p:cTn id="1" dur="indefinite" restart="never" nodeType="tmRoot"/>
-      </p:par>
-    </p:tnLst>
-  </p:timing>
 </p:sldLayout>
 </file>
 
@@ -5554,7 +5514,7 @@
           <a:p>
             <a:fld id="{5958763E-B898-436D-883D-03711491D54A}" type="datetimeFigureOut">
               <a:rPr lang="en-US" smtClean="0"/>
-              <a:t>10/22/2020</a:t>
+              <a:t>2/4/2021</a:t>
             </a:fld>
             <a:endParaRPr lang="en-US"/>
           </a:p>
@@ -5615,13 +5575,6 @@
   <p:transition>
     <p:fade/>
   </p:transition>
-  <p:timing>
-    <p:tnLst>
-      <p:par>
-        <p:cTn id="1" dur="indefinite" restart="never" nodeType="tmRoot"/>
-      </p:par>
-    </p:tnLst>
-  </p:timing>
 </p:sldLayout>
 </file>
 
@@ -5977,7 +5930,7 @@
           <a:p>
             <a:fld id="{5958763E-B898-436D-883D-03711491D54A}" type="datetimeFigureOut">
               <a:rPr lang="en-US" smtClean="0"/>
-              <a:t>10/22/2020</a:t>
+              <a:t>2/4/2021</a:t>
             </a:fld>
             <a:endParaRPr lang="en-US"/>
           </a:p>
@@ -6038,13 +5991,6 @@
   <p:transition>
     <p:fade/>
   </p:transition>
-  <p:timing>
-    <p:tnLst>
-      <p:par>
-        <p:cTn id="1" dur="indefinite" restart="never" nodeType="tmRoot"/>
-      </p:par>
-    </p:tnLst>
-  </p:timing>
 </p:sldLayout>
 </file>
 
@@ -6485,7 +6431,7 @@
           <a:p>
             <a:fld id="{5958763E-B898-436D-883D-03711491D54A}" type="datetimeFigureOut">
               <a:rPr lang="en-US" smtClean="0"/>
-              <a:t>10/22/2020</a:t>
+              <a:t>2/4/2021</a:t>
             </a:fld>
             <a:endParaRPr lang="en-US"/>
           </a:p>
@@ -6546,13 +6492,6 @@
   <p:transition>
     <p:fade/>
   </p:transition>
-  <p:timing>
-    <p:tnLst>
-      <p:par>
-        <p:cTn id="1" dur="indefinite" restart="never" nodeType="tmRoot"/>
-      </p:par>
-    </p:tnLst>
-  </p:timing>
 </p:sldLayout>
 </file>
 
@@ -6943,7 +6882,7 @@
           <a:p>
             <a:fld id="{5958763E-B898-436D-883D-03711491D54A}" type="datetimeFigureOut">
               <a:rPr lang="en-US" smtClean="0"/>
-              <a:t>10/22/2020</a:t>
+              <a:t>2/4/2021</a:t>
             </a:fld>
             <a:endParaRPr lang="en-US"/>
           </a:p>
@@ -7004,13 +6943,6 @@
   <p:transition>
     <p:fade/>
   </p:transition>
-  <p:timing>
-    <p:tnLst>
-      <p:par>
-        <p:cTn id="1" dur="indefinite" restart="never" nodeType="tmRoot"/>
-      </p:par>
-    </p:tnLst>
-  </p:timing>
 </p:sldLayout>
 </file>
 
@@ -7561,7 +7493,7 @@
           <a:p>
             <a:fld id="{5958763E-B898-436D-883D-03711491D54A}" type="datetimeFigureOut">
               <a:rPr lang="en-US" smtClean="0"/>
-              <a:t>10/22/2020</a:t>
+              <a:t>2/4/2021</a:t>
             </a:fld>
             <a:endParaRPr lang="en-US"/>
           </a:p>
@@ -7622,13 +7554,6 @@
   <p:transition>
     <p:fade/>
   </p:transition>
-  <p:timing>
-    <p:tnLst>
-      <p:par>
-        <p:cTn id="1" dur="indefinite" restart="never" nodeType="tmRoot"/>
-      </p:par>
-    </p:tnLst>
-  </p:timing>
 </p:sldLayout>
 </file>
 
@@ -8339,7 +8264,7 @@
           <a:p>
             <a:fld id="{5958763E-B898-436D-883D-03711491D54A}" type="datetimeFigureOut">
               <a:rPr lang="en-US" smtClean="0"/>
-              <a:t>10/22/2020</a:t>
+              <a:t>2/4/2021</a:t>
             </a:fld>
             <a:endParaRPr lang="en-US"/>
           </a:p>
@@ -8400,13 +8325,6 @@
   <p:transition>
     <p:fade/>
   </p:transition>
-  <p:timing>
-    <p:tnLst>
-      <p:par>
-        <p:cTn id="1" dur="indefinite" restart="never" nodeType="tmRoot"/>
-      </p:par>
-    </p:tnLst>
-  </p:timing>
 </p:sldLayout>
 </file>
 
@@ -8450,7 +8368,7 @@
           <a:p>
             <a:fld id="{5958763E-B898-436D-883D-03711491D54A}" type="datetimeFigureOut">
               <a:rPr lang="en-US" smtClean="0"/>
-              <a:t>10/22/2020</a:t>
+              <a:t>2/4/2021</a:t>
             </a:fld>
             <a:endParaRPr lang="en-US"/>
           </a:p>
@@ -8523,13 +8441,6 @@
   <p:transition>
     <p:fade/>
   </p:transition>
-  <p:timing>
-    <p:tnLst>
-      <p:par>
-        <p:cTn id="1" dur="indefinite" restart="never" nodeType="tmRoot"/>
-      </p:par>
-    </p:tnLst>
-  </p:timing>
 </p:sldLayout>
 </file>
 
@@ -8609,7 +8520,7 @@
                 <a:spcPct val="0"/>
               </a:spcAft>
             </a:pPr>
-            <a:endParaRPr lang="en-US" sz="2400" dirty="0" err="1" smtClean="0">
+            <a:endParaRPr lang="en-US" sz="2400" dirty="0" err="1">
               <a:gradFill>
                 <a:gsLst>
                   <a:gs pos="0">
@@ -8742,15 +8653,7 @@
           <a:p>
             <a:r>
               <a:rPr lang="en-US" dirty="0"/>
-              <a:t>Click to edit Master </a:t>
-            </a:r>
-            <a:r>
-              <a:rPr lang="en-US" dirty="0" smtClean="0"/>
-              <a:t>subtitle </a:t>
-            </a:r>
-            <a:r>
-              <a:rPr lang="en-US" dirty="0"/>
-              <a:t>style</a:t>
+              <a:t>Click to edit Master subtitle style</a:t>
             </a:r>
           </a:p>
         </p:txBody>
@@ -8792,7 +8695,7 @@
             <a:fld id="{1C2D31DE-C454-491C-B5C3-F097855E3DF7}" type="datetime4">
               <a:rPr lang="en-US" smtClean="0"/>
               <a:pPr/>
-              <a:t>October 22, 2020</a:t>
+              <a:t>February 4, 2021</a:t>
             </a:fld>
             <a:endParaRPr lang="en-US" dirty="0"/>
           </a:p>
@@ -11866,17 +11769,16 @@
           <a:p>
             <a:pPr lvl="0"/>
             <a:r>
-              <a:rPr lang="en-US" dirty="0" smtClean="0"/>
+              <a:rPr lang="en-US" dirty="0"/>
               <a:t>Presenter Name</a:t>
             </a:r>
             <a:br>
-              <a:rPr lang="en-US" dirty="0" smtClean="0"/>
+              <a:rPr lang="en-US" dirty="0"/>
             </a:br>
             <a:r>
-              <a:rPr lang="en-US" dirty="0" smtClean="0"/>
+              <a:rPr lang="en-US" dirty="0"/>
               <a:t>Presenter Title</a:t>
             </a:r>
-            <a:endParaRPr lang="en-US" dirty="0"/>
           </a:p>
         </p:txBody>
       </p:sp>
@@ -11893,13 +11795,6 @@
   <p:transition>
     <p:fade/>
   </p:transition>
-  <p:timing>
-    <p:tnLst>
-      <p:par>
-        <p:cTn id="1" dur="indefinite" restart="never" nodeType="tmRoot"/>
-      </p:par>
-    </p:tnLst>
-  </p:timing>
   <p:hf sldNum="0" hdr="0" ftr="0"/>
 </p:sldLayout>
 </file>
@@ -11952,7 +11847,7 @@
           <a:p>
             <a:fld id="{5958763E-B898-436D-883D-03711491D54A}" type="datetimeFigureOut">
               <a:rPr lang="en-US" smtClean="0"/>
-              <a:t>10/22/2020</a:t>
+              <a:t>2/4/2021</a:t>
             </a:fld>
             <a:endParaRPr lang="en-US"/>
           </a:p>
@@ -12025,13 +11920,6 @@
   <p:transition>
     <p:fade/>
   </p:transition>
-  <p:timing>
-    <p:tnLst>
-      <p:par>
-        <p:cTn id="1" dur="indefinite" restart="never" nodeType="tmRoot"/>
-      </p:par>
-    </p:tnLst>
-  </p:timing>
 </p:sldLayout>
 </file>
 
@@ -12083,7 +11971,7 @@
           <a:p>
             <a:fld id="{5958763E-B898-436D-883D-03711491D54A}" type="datetimeFigureOut">
               <a:rPr lang="en-US" smtClean="0"/>
-              <a:t>10/22/2020</a:t>
+              <a:t>2/4/2021</a:t>
             </a:fld>
             <a:endParaRPr lang="en-US"/>
           </a:p>
@@ -12156,13 +12044,6 @@
   <p:transition>
     <p:fade/>
   </p:transition>
-  <p:timing>
-    <p:tnLst>
-      <p:par>
-        <p:cTn id="1" dur="indefinite" restart="never" nodeType="tmRoot"/>
-      </p:par>
-    </p:tnLst>
-  </p:timing>
 </p:sldLayout>
 </file>
 
@@ -12214,7 +12095,7 @@
           <a:p>
             <a:fld id="{5958763E-B898-436D-883D-03711491D54A}" type="datetimeFigureOut">
               <a:rPr lang="en-US" smtClean="0"/>
-              <a:t>10/22/2020</a:t>
+              <a:t>2/4/2021</a:t>
             </a:fld>
             <a:endParaRPr lang="en-US"/>
           </a:p>
@@ -12287,13 +12168,6 @@
   <p:transition>
     <p:fade/>
   </p:transition>
-  <p:timing>
-    <p:tnLst>
-      <p:par>
-        <p:cTn id="1" dur="indefinite" restart="never" nodeType="tmRoot"/>
-      </p:par>
-    </p:tnLst>
-  </p:timing>
 </p:sldLayout>
 </file>
 
@@ -12345,7 +12219,7 @@
           <a:p>
             <a:fld id="{5958763E-B898-436D-883D-03711491D54A}" type="datetimeFigureOut">
               <a:rPr lang="en-US" smtClean="0"/>
-              <a:t>10/22/2020</a:t>
+              <a:t>2/4/2021</a:t>
             </a:fld>
             <a:endParaRPr lang="en-US"/>
           </a:p>
@@ -12418,13 +12292,6 @@
   <p:transition>
     <p:fade/>
   </p:transition>
-  <p:timing>
-    <p:tnLst>
-      <p:par>
-        <p:cTn id="1" dur="indefinite" restart="never" nodeType="tmRoot"/>
-      </p:par>
-    </p:tnLst>
-  </p:timing>
 </p:sldLayout>
 </file>
 
@@ -12476,7 +12343,7 @@
           <a:p>
             <a:fld id="{5958763E-B898-436D-883D-03711491D54A}" type="datetimeFigureOut">
               <a:rPr lang="en-US" smtClean="0"/>
-              <a:t>10/22/2020</a:t>
+              <a:t>2/4/2021</a:t>
             </a:fld>
             <a:endParaRPr lang="en-US"/>
           </a:p>
@@ -12549,13 +12416,6 @@
   <p:transition>
     <p:fade/>
   </p:transition>
-  <p:timing>
-    <p:tnLst>
-      <p:par>
-        <p:cTn id="1" dur="indefinite" restart="never" nodeType="tmRoot"/>
-      </p:par>
-    </p:tnLst>
-  </p:timing>
 </p:sldLayout>
 </file>
 
@@ -12607,7 +12467,7 @@
           <a:p>
             <a:fld id="{5958763E-B898-436D-883D-03711491D54A}" type="datetimeFigureOut">
               <a:rPr lang="en-US" smtClean="0"/>
-              <a:t>10/22/2020</a:t>
+              <a:t>2/4/2021</a:t>
             </a:fld>
             <a:endParaRPr lang="en-US"/>
           </a:p>
@@ -12680,13 +12540,6 @@
   <p:transition>
     <p:fade/>
   </p:transition>
-  <p:timing>
-    <p:tnLst>
-      <p:par>
-        <p:cTn id="1" dur="indefinite" restart="never" nodeType="tmRoot"/>
-      </p:par>
-    </p:tnLst>
-  </p:timing>
 </p:sldLayout>
 </file>
 
@@ -12738,7 +12591,7 @@
           <a:p>
             <a:fld id="{5958763E-B898-436D-883D-03711491D54A}" type="datetimeFigureOut">
               <a:rPr lang="en-US" smtClean="0"/>
-              <a:t>10/22/2020</a:t>
+              <a:t>2/4/2021</a:t>
             </a:fld>
             <a:endParaRPr lang="en-US"/>
           </a:p>
@@ -12811,13 +12664,6 @@
   <p:transition>
     <p:fade/>
   </p:transition>
-  <p:timing>
-    <p:tnLst>
-      <p:par>
-        <p:cTn id="1" dur="indefinite" restart="never" nodeType="tmRoot"/>
-      </p:par>
-    </p:tnLst>
-  </p:timing>
 </p:sldLayout>
 </file>
 
@@ -12869,7 +12715,7 @@
           <a:p>
             <a:fld id="{5958763E-B898-436D-883D-03711491D54A}" type="datetimeFigureOut">
               <a:rPr lang="en-US" smtClean="0"/>
-              <a:t>10/22/2020</a:t>
+              <a:t>2/4/2021</a:t>
             </a:fld>
             <a:endParaRPr lang="en-US"/>
           </a:p>
@@ -12942,13 +12788,6 @@
   <p:transition>
     <p:fade/>
   </p:transition>
-  <p:timing>
-    <p:tnLst>
-      <p:par>
-        <p:cTn id="1" dur="indefinite" restart="never" nodeType="tmRoot"/>
-      </p:par>
-    </p:tnLst>
-  </p:timing>
 </p:sldLayout>
 </file>
 
@@ -13009,7 +12848,7 @@
           <a:p>
             <a:fld id="{5958763E-B898-436D-883D-03711491D54A}" type="datetimeFigureOut">
               <a:rPr lang="en-US" smtClean="0"/>
-              <a:t>10/22/2020</a:t>
+              <a:t>2/4/2021</a:t>
             </a:fld>
             <a:endParaRPr lang="en-US"/>
           </a:p>
@@ -13082,13 +12921,6 @@
   <p:transition>
     <p:fade/>
   </p:transition>
-  <p:timing>
-    <p:tnLst>
-      <p:par>
-        <p:cTn id="1" dur="indefinite" restart="never" nodeType="tmRoot"/>
-      </p:par>
-    </p:tnLst>
-  </p:timing>
 </p:sldLayout>
 </file>
 
@@ -16090,13 +15922,6 @@
   <p:transition>
     <p:fade/>
   </p:transition>
-  <p:timing>
-    <p:tnLst>
-      <p:par>
-        <p:cTn id="1" dur="indefinite" restart="never" nodeType="tmRoot"/>
-      </p:par>
-    </p:tnLst>
-  </p:timing>
 </p:sldLayout>
 </file>
 
@@ -16184,7 +16009,7 @@
                 <a:spcPct val="0"/>
               </a:spcAft>
             </a:pPr>
-            <a:endParaRPr lang="en-US" sz="2400" dirty="0" err="1" smtClean="0">
+            <a:endParaRPr lang="en-US" sz="2400" dirty="0" err="1">
               <a:gradFill>
                 <a:gsLst>
                   <a:gs pos="0">
@@ -16320,15 +16145,7 @@
           <a:p>
             <a:r>
               <a:rPr lang="en-US" dirty="0"/>
-              <a:t>Click to edit Master </a:t>
-            </a:r>
-            <a:r>
-              <a:rPr lang="en-US" dirty="0" smtClean="0"/>
-              <a:t>subtitle </a:t>
-            </a:r>
-            <a:r>
-              <a:rPr lang="en-US" dirty="0"/>
-              <a:t>style</a:t>
+              <a:t>Click to edit Master subtitle style</a:t>
             </a:r>
           </a:p>
         </p:txBody>
@@ -16370,7 +16187,7 @@
             <a:fld id="{1C2D31DE-C454-491C-B5C3-F097855E3DF7}" type="datetime4">
               <a:rPr lang="en-US" smtClean="0"/>
               <a:pPr/>
-              <a:t>October 22, 2020</a:t>
+              <a:t>February 4, 2021</a:t>
             </a:fld>
             <a:endParaRPr lang="en-US" dirty="0"/>
           </a:p>
@@ -19452,17 +19269,16 @@
           <a:p>
             <a:pPr lvl="0"/>
             <a:r>
-              <a:rPr lang="en-US" dirty="0" smtClean="0"/>
+              <a:rPr lang="en-US" dirty="0"/>
               <a:t>Presenter Name</a:t>
             </a:r>
             <a:br>
-              <a:rPr lang="en-US" dirty="0" smtClean="0"/>
+              <a:rPr lang="en-US" dirty="0"/>
             </a:br>
             <a:r>
-              <a:rPr lang="en-US" dirty="0" smtClean="0"/>
+              <a:rPr lang="en-US" dirty="0"/>
               <a:t>Presenter Title</a:t>
             </a:r>
-            <a:endParaRPr lang="en-US" dirty="0"/>
           </a:p>
         </p:txBody>
       </p:sp>
@@ -19479,13 +19295,6 @@
   <p:transition>
     <p:fade/>
   </p:transition>
-  <p:timing>
-    <p:tnLst>
-      <p:par>
-        <p:cTn id="1" dur="indefinite" restart="never" nodeType="tmRoot"/>
-      </p:par>
-    </p:tnLst>
-  </p:timing>
   <p:hf sldNum="0" hdr="0" ftr="0"/>
 </p:sldLayout>
 </file>
@@ -26995,10 +26804,9 @@
           <a:p>
             <a:pPr lvl="0"/>
             <a:r>
-              <a:rPr lang="en-US" dirty="0" smtClean="0"/>
+              <a:rPr lang="en-US" dirty="0"/>
               <a:t>&lt;Call to action&gt;</a:t>
             </a:r>
-            <a:endParaRPr lang="en-US" dirty="0"/>
           </a:p>
         </p:txBody>
       </p:sp>
@@ -28615,7 +28423,7 @@
           <a:p>
             <a:fld id="{5958763E-B898-436D-883D-03711491D54A}" type="datetimeFigureOut">
               <a:rPr lang="en-US" smtClean="0"/>
-              <a:t>10/22/2020</a:t>
+              <a:t>2/4/2021</a:t>
             </a:fld>
             <a:endParaRPr lang="en-US"/>
           </a:p>
@@ -28742,7 +28550,7 @@
                 <a:spcPct val="0"/>
               </a:spcAft>
             </a:pPr>
-            <a:endParaRPr lang="en-US" sz="2400" dirty="0" err="1" smtClean="0">
+            <a:endParaRPr lang="en-US" sz="2400" dirty="0" err="1">
               <a:gradFill>
                 <a:gsLst>
                   <a:gs pos="0">
@@ -28773,13 +28581,6 @@
   <p:transition>
     <p:fade/>
   </p:transition>
-  <p:timing>
-    <p:tnLst>
-      <p:par>
-        <p:cTn id="1" dur="indefinite" restart="never" nodeType="tmRoot"/>
-      </p:par>
-    </p:tnLst>
-  </p:timing>
 </p:sldLayout>
 </file>
 
@@ -29024,7 +28825,7 @@
           <a:p>
             <a:fld id="{5958763E-B898-436D-883D-03711491D54A}" type="datetimeFigureOut">
               <a:rPr lang="en-US" smtClean="0"/>
-              <a:t>10/22/2020</a:t>
+              <a:t>2/4/2021</a:t>
             </a:fld>
             <a:endParaRPr lang="en-US"/>
           </a:p>
@@ -29097,13 +28898,6 @@
   <p:transition>
     <p:fade/>
   </p:transition>
-  <p:timing>
-    <p:tnLst>
-      <p:par>
-        <p:cTn id="1" dur="indefinite" restart="never" nodeType="tmRoot"/>
-      </p:par>
-    </p:tnLst>
-  </p:timing>
 </p:sldLayout>
 </file>
 
@@ -29325,7 +29119,7 @@
           <a:p>
             <a:fld id="{5958763E-B898-436D-883D-03711491D54A}" type="datetimeFigureOut">
               <a:rPr lang="en-US" smtClean="0"/>
-              <a:t>10/22/2020</a:t>
+              <a:t>2/4/2021</a:t>
             </a:fld>
             <a:endParaRPr lang="en-US"/>
           </a:p>
@@ -29398,13 +29192,6 @@
   <p:transition>
     <p:fade/>
   </p:transition>
-  <p:timing>
-    <p:tnLst>
-      <p:par>
-        <p:cTn id="1" dur="indefinite" restart="never" nodeType="tmRoot"/>
-      </p:par>
-    </p:tnLst>
-  </p:timing>
 </p:sldLayout>
 </file>
 
@@ -29533,7 +29320,7 @@
           <a:p>
             <a:fld id="{5958763E-B898-436D-883D-03711491D54A}" type="datetimeFigureOut">
               <a:rPr lang="en-US" smtClean="0"/>
-              <a:t>10/22/2020</a:t>
+              <a:t>2/4/2021</a:t>
             </a:fld>
             <a:endParaRPr lang="en-US"/>
           </a:p>
@@ -29656,13 +29443,6 @@
   <p:transition>
     <p:fade/>
   </p:transition>
-  <p:timing>
-    <p:tnLst>
-      <p:par>
-        <p:cTn id="1" dur="indefinite" restart="never" nodeType="tmRoot"/>
-      </p:par>
-    </p:tnLst>
-  </p:timing>
 </p:sldLayout>
 </file>
 
@@ -29801,7 +29581,7 @@
           <a:p>
             <a:fld id="{5958763E-B898-436D-883D-03711491D54A}" type="datetimeFigureOut">
               <a:rPr lang="en-US" smtClean="0"/>
-              <a:t>10/22/2020</a:t>
+              <a:t>2/4/2021</a:t>
             </a:fld>
             <a:endParaRPr lang="en-US"/>
           </a:p>
@@ -29928,13 +29708,6 @@
   <p:transition>
     <p:fade/>
   </p:transition>
-  <p:timing>
-    <p:tnLst>
-      <p:par>
-        <p:cTn id="1" dur="indefinite" restart="never" nodeType="tmRoot"/>
-      </p:par>
-    </p:tnLst>
-  </p:timing>
 </p:sldLayout>
 </file>
 
@@ -30096,7 +29869,7 @@
                 <a:spcPct val="0"/>
               </a:spcAft>
             </a:pPr>
-            <a:endParaRPr lang="en-US" sz="2400" dirty="0" err="1" smtClean="0">
+            <a:endParaRPr lang="en-US" sz="2400" dirty="0" err="1">
               <a:gradFill>
                 <a:gsLst>
                   <a:gs pos="0">
@@ -30147,10 +29920,9 @@
           </a:lstStyle>
           <a:p>
             <a:r>
-              <a:rPr lang="en-US" dirty="0" smtClean="0"/>
+              <a:rPr lang="en-US" dirty="0"/>
               <a:t>Type “Agenda”</a:t>
             </a:r>
-            <a:endParaRPr lang="en-US" dirty="0"/>
           </a:p>
         </p:txBody>
       </p:sp>
@@ -30274,24 +30046,23 @@
           <a:p>
             <a:pPr lvl="0"/>
             <a:r>
-              <a:rPr lang="en-US" dirty="0" smtClean="0"/>
+              <a:rPr lang="en-US" dirty="0"/>
               <a:t>Item 1</a:t>
             </a:r>
           </a:p>
           <a:p>
             <a:pPr lvl="0"/>
             <a:r>
-              <a:rPr lang="en-US" dirty="0" smtClean="0"/>
+              <a:rPr lang="en-US" dirty="0"/>
               <a:t>Item 2</a:t>
             </a:r>
           </a:p>
           <a:p>
             <a:pPr lvl="0"/>
             <a:r>
-              <a:rPr lang="en-US" dirty="0" smtClean="0"/>
+              <a:rPr lang="en-US" dirty="0"/>
               <a:t>Item 3</a:t>
             </a:r>
-            <a:endParaRPr lang="en-US" dirty="0"/>
           </a:p>
         </p:txBody>
       </p:sp>
@@ -30318,7 +30089,7 @@
           <a:p>
             <a:fld id="{5958763E-B898-436D-883D-03711491D54A}" type="datetimeFigureOut">
               <a:rPr lang="en-US" smtClean="0"/>
-              <a:t>10/22/2020</a:t>
+              <a:t>2/4/2021</a:t>
             </a:fld>
             <a:endParaRPr lang="en-US"/>
           </a:p>
@@ -30425,13 +30196,6 @@
   <p:transition>
     <p:fade/>
   </p:transition>
-  <p:timing>
-    <p:tnLst>
-      <p:par>
-        <p:cTn id="1" dur="indefinite" restart="never" nodeType="tmRoot"/>
-      </p:par>
-    </p:tnLst>
-  </p:timing>
 </p:sldLayout>
 </file>
 
@@ -30593,7 +30357,7 @@
                 <a:spcPct val="0"/>
               </a:spcAft>
             </a:pPr>
-            <a:endParaRPr lang="en-US" sz="2400" dirty="0" err="1" smtClean="0">
+            <a:endParaRPr lang="en-US" sz="2400" dirty="0" err="1">
               <a:gradFill>
                 <a:gsLst>
                   <a:gs pos="0">
@@ -30646,10 +30410,9 @@
           </a:lstStyle>
           <a:p>
             <a:r>
-              <a:rPr lang="en-US" dirty="0" smtClean="0"/>
+              <a:rPr lang="en-US" dirty="0"/>
               <a:t>Notable Quote</a:t>
             </a:r>
-            <a:endParaRPr lang="en-US" dirty="0"/>
           </a:p>
         </p:txBody>
       </p:sp>
@@ -30776,10 +30539,9 @@
           <a:p>
             <a:pPr lvl="0"/>
             <a:r>
-              <a:rPr lang="en-US" dirty="0" smtClean="0"/>
+              <a:rPr lang="en-US" dirty="0"/>
               <a:t>– Attribution</a:t>
             </a:r>
-            <a:endParaRPr lang="en-US" dirty="0"/>
           </a:p>
         </p:txBody>
       </p:sp>
@@ -30806,7 +30568,7 @@
           <a:p>
             <a:fld id="{5958763E-B898-436D-883D-03711491D54A}" type="datetimeFigureOut">
               <a:rPr lang="en-US" smtClean="0"/>
-              <a:t>10/22/2020</a:t>
+              <a:t>2/4/2021</a:t>
             </a:fld>
             <a:endParaRPr lang="en-US"/>
           </a:p>
@@ -31554,13 +31316,6 @@
   <p:transition>
     <p:fade/>
   </p:transition>
-  <p:timing>
-    <p:tnLst>
-      <p:par>
-        <p:cTn id="1" dur="indefinite" restart="never" nodeType="tmRoot"/>
-      </p:par>
-    </p:tnLst>
-  </p:timing>
 </p:sldLayout>
 </file>
 
@@ -31632,7 +31387,7 @@
           <a:p>
             <a:fld id="{5958763E-B898-436D-883D-03711491D54A}" type="datetimeFigureOut">
               <a:rPr lang="en-US" smtClean="0"/>
-              <a:t>10/22/2020</a:t>
+              <a:t>2/4/2021</a:t>
             </a:fld>
             <a:endParaRPr lang="en-US"/>
           </a:p>
@@ -31705,13 +31460,6 @@
   <p:transition>
     <p:fade/>
   </p:transition>
-  <p:timing>
-    <p:tnLst>
-      <p:par>
-        <p:cTn id="1" dur="indefinite" restart="never" nodeType="tmRoot"/>
-      </p:par>
-    </p:tnLst>
-  </p:timing>
 </p:sldLayout>
 </file>
 
@@ -31840,7 +31588,7 @@
           <a:p>
             <a:fld id="{5958763E-B898-436D-883D-03711491D54A}" type="datetimeFigureOut">
               <a:rPr lang="en-US" smtClean="0"/>
-              <a:t>10/22/2020</a:t>
+              <a:t>2/4/2021</a:t>
             </a:fld>
             <a:endParaRPr lang="en-US"/>
           </a:p>
@@ -31963,13 +31711,6 @@
   <p:transition>
     <p:fade/>
   </p:transition>
-  <p:timing>
-    <p:tnLst>
-      <p:par>
-        <p:cTn id="1" dur="indefinite" restart="never" nodeType="tmRoot"/>
-      </p:par>
-    </p:tnLst>
-  </p:timing>
 </p:sldLayout>
 </file>
 
@@ -32182,7 +31923,7 @@
           <a:p>
             <a:fld id="{5958763E-B898-436D-883D-03711491D54A}" type="datetimeFigureOut">
               <a:rPr lang="en-US" smtClean="0"/>
-              <a:t>10/22/2020</a:t>
+              <a:t>2/4/2021</a:t>
             </a:fld>
             <a:endParaRPr lang="en-US"/>
           </a:p>
@@ -32255,13 +31996,6 @@
   <p:transition>
     <p:fade/>
   </p:transition>
-  <p:timing>
-    <p:tnLst>
-      <p:par>
-        <p:cTn id="1" dur="indefinite" restart="never" nodeType="tmRoot"/>
-      </p:par>
-    </p:tnLst>
-  </p:timing>
 </p:sldLayout>
 </file>
 
@@ -32419,7 +32153,7 @@
           <a:p>
             <a:fld id="{5958763E-B898-436D-883D-03711491D54A}" type="datetimeFigureOut">
               <a:rPr lang="en-US" smtClean="0"/>
-              <a:t>10/22/2020</a:t>
+              <a:t>2/4/2021</a:t>
             </a:fld>
             <a:endParaRPr lang="en-US"/>
           </a:p>
@@ -32492,13 +32226,6 @@
   <p:transition>
     <p:fade/>
   </p:transition>
-  <p:timing>
-    <p:tnLst>
-      <p:par>
-        <p:cTn id="1" dur="indefinite" restart="never" nodeType="tmRoot"/>
-      </p:par>
-    </p:tnLst>
-  </p:timing>
 </p:sldLayout>
 </file>
 
@@ -32670,7 +32397,7 @@
           <a:p>
             <a:fld id="{5958763E-B898-436D-883D-03711491D54A}" type="datetimeFigureOut">
               <a:rPr lang="en-US" smtClean="0"/>
-              <a:t>10/22/2020</a:t>
+              <a:t>2/4/2021</a:t>
             </a:fld>
             <a:endParaRPr lang="en-US"/>
           </a:p>
@@ -32816,13 +32543,6 @@
   <p:transition>
     <p:fade/>
   </p:transition>
-  <p:timing>
-    <p:tnLst>
-      <p:par>
-        <p:cTn id="1" dur="indefinite" restart="never" nodeType="tmRoot"/>
-      </p:par>
-    </p:tnLst>
-  </p:timing>
   <p:txStyles>
     <p:titleStyle>
       <a:lvl1pPr algn="l" defTabSz="914400" rtl="0" eaLnBrk="1" latinLnBrk="0" hangingPunct="1">
@@ -33127,7 +32847,7 @@
       </a:lvl9pPr>
     </p:otherStyle>
   </p:txStyles>
-  <p:extLst mod="1">
+  <p:extLst>
     <p:ext uri="{27BBF7A9-308A-43DC-89C8-2F10F3537804}">
       <p15:sldGuideLst xmlns:p15="http://schemas.microsoft.com/office/powerpoint/2012/main">
         <p15:guide id="1" orient="horz" pos="2160" userDrawn="1">
@@ -33206,10 +32926,9 @@
           <a:lstStyle/>
           <a:p>
             <a:r>
-              <a:rPr lang="en-US" sz="6600" dirty="0" smtClean="0"/>
+              <a:rPr lang="en-US" sz="6600" dirty="0"/>
               <a:t>While Loops</a:t>
             </a:r>
-            <a:endParaRPr lang="en-US" sz="6600" dirty="0"/>
           </a:p>
         </p:txBody>
       </p:sp>
@@ -33234,10 +32953,9 @@
           <a:lstStyle/>
           <a:p>
             <a:r>
-              <a:rPr lang="en-US" dirty="0" smtClean="0"/>
+              <a:rPr lang="en-US" dirty="0"/>
               <a:t>Hy-Tech Club: C# 101</a:t>
             </a:r>
-            <a:endParaRPr lang="en-US" dirty="0"/>
           </a:p>
         </p:txBody>
       </p:sp>
@@ -36222,13 +35940,6 @@
   <p:transition>
     <p:fade/>
   </p:transition>
-  <p:timing>
-    <p:tnLst>
-      <p:par>
-        <p:cTn id="1" dur="indefinite" restart="never" nodeType="tmRoot"/>
-      </p:par>
-    </p:tnLst>
-  </p:timing>
 </p:sld>
 </file>
 
@@ -36267,7 +35978,7 @@
           <a:lstStyle/>
           <a:p>
             <a:r>
-              <a:rPr lang="en-US" sz="3600" cap="none" dirty="0" smtClean="0">
+              <a:rPr lang="en-US" sz="3600" cap="none" dirty="0">
                 <a:solidFill>
                   <a:srgbClr val="0000FF"/>
                 </a:solidFill>
@@ -36276,10 +35987,9 @@
               <a:t>while</a:t>
             </a:r>
             <a:r>
-              <a:rPr lang="en-US" dirty="0" smtClean="0"/>
+              <a:rPr lang="en-US" dirty="0"/>
               <a:t> Loops</a:t>
             </a:r>
-            <a:endParaRPr lang="en-US" dirty="0"/>
           </a:p>
         </p:txBody>
       </p:sp>
@@ -36306,7 +36016,7 @@
           <a:lstStyle/>
           <a:p>
             <a:r>
-              <a:rPr lang="en-US" dirty="0" smtClean="0">
+              <a:rPr lang="en-US" dirty="0">
                 <a:solidFill>
                   <a:srgbClr val="0000FF"/>
                 </a:solidFill>
@@ -36315,25 +36025,25 @@
               <a:t>while</a:t>
             </a:r>
             <a:r>
-              <a:rPr lang="en-US" dirty="0" smtClean="0"/>
+              <a:rPr lang="en-US" dirty="0"/>
               <a:t> loops repeat blocks of code </a:t>
             </a:r>
             <a:r>
-              <a:rPr lang="en-US" i="1" dirty="0" smtClean="0"/>
+              <a:rPr lang="en-US" i="1" dirty="0"/>
               <a:t>while</a:t>
             </a:r>
             <a:r>
-              <a:rPr lang="en-US" dirty="0" smtClean="0"/>
+              <a:rPr lang="en-US" dirty="0"/>
               <a:t> a given condition is true</a:t>
             </a:r>
           </a:p>
           <a:p>
             <a:r>
-              <a:rPr lang="en-US" dirty="0" smtClean="0"/>
+              <a:rPr lang="en-US" dirty="0"/>
               <a:t>They are a lot like </a:t>
             </a:r>
             <a:r>
-              <a:rPr lang="en-US" dirty="0" smtClean="0">
+              <a:rPr lang="en-US" dirty="0">
                 <a:solidFill>
                   <a:srgbClr val="0000FF"/>
                 </a:solidFill>
@@ -36343,17 +36053,13 @@
             </a:r>
             <a:r>
               <a:rPr lang="en-US" dirty="0"/>
-              <a:t> </a:t>
-            </a:r>
-            <a:r>
-              <a:rPr lang="en-US" dirty="0" smtClean="0"/>
-              <a:t>statements</a:t>
+              <a:t> statements</a:t>
             </a:r>
           </a:p>
           <a:p>
             <a:pPr lvl="1"/>
             <a:r>
-              <a:rPr lang="en-US" dirty="0" smtClean="0"/>
+              <a:rPr lang="en-US" dirty="0"/>
               <a:t>The difference is that they run the code multiple times</a:t>
             </a:r>
           </a:p>
@@ -36361,14 +36067,14 @@
             <a:pPr marL="57150" indent="0">
               <a:buNone/>
             </a:pPr>
-            <a:endParaRPr lang="en-US" dirty="0" smtClean="0"/>
+            <a:endParaRPr lang="en-US" dirty="0"/>
           </a:p>
           <a:p>
             <a:pPr marL="400050" lvl="1" indent="0">
               <a:buNone/>
             </a:pPr>
             <a:r>
-              <a:rPr lang="en-US" sz="4000" dirty="0" smtClean="0">
+              <a:rPr lang="en-US" sz="4000" dirty="0">
                 <a:solidFill>
                   <a:srgbClr val="0000FF"/>
                 </a:solidFill>
@@ -36377,13 +36083,22 @@
               <a:t>while</a:t>
             </a:r>
             <a:r>
-              <a:rPr lang="en-US" sz="4000" dirty="0" smtClean="0">
+              <a:rPr lang="en-US" sz="4000" dirty="0">
                 <a:solidFill>
                   <a:srgbClr val="000000"/>
                 </a:solidFill>
                 <a:latin typeface="Consolas" panose="020B0609020204030204" pitchFamily="49" charset="0"/>
               </a:rPr>
-              <a:t> </a:t>
+              <a:t> (</a:t>
+            </a:r>
+            <a:r>
+              <a:rPr lang="en-US" sz="4000" i="1" dirty="0">
+                <a:solidFill>
+                  <a:srgbClr val="FF0000"/>
+                </a:solidFill>
+                <a:latin typeface="Consolas" panose="020B0609020204030204" pitchFamily="49" charset="0"/>
+              </a:rPr>
+              <a:t>condition</a:t>
             </a:r>
             <a:r>
               <a:rPr lang="en-US" sz="4000" dirty="0">
@@ -36392,32 +36107,8 @@
                 </a:solidFill>
                 <a:latin typeface="Consolas" panose="020B0609020204030204" pitchFamily="49" charset="0"/>
               </a:rPr>
-              <a:t>(</a:t>
-            </a:r>
-            <a:r>
-              <a:rPr lang="en-US" sz="4000" i="1" dirty="0" smtClean="0">
-                <a:solidFill>
-                  <a:srgbClr val="FF0000"/>
-                </a:solidFill>
-                <a:latin typeface="Consolas" panose="020B0609020204030204" pitchFamily="49" charset="0"/>
-              </a:rPr>
-              <a:t>condition</a:t>
-            </a:r>
-            <a:r>
-              <a:rPr lang="en-US" sz="4000" dirty="0" smtClean="0">
-                <a:solidFill>
-                  <a:srgbClr val="000000"/>
-                </a:solidFill>
-                <a:latin typeface="Consolas" panose="020B0609020204030204" pitchFamily="49" charset="0"/>
-              </a:rPr>
               <a:t>)</a:t>
             </a:r>
-            <a:endParaRPr lang="en-US" sz="4000" dirty="0">
-              <a:solidFill>
-                <a:srgbClr val="000000"/>
-              </a:solidFill>
-              <a:latin typeface="Consolas" panose="020B0609020204030204" pitchFamily="49" charset="0"/>
-            </a:endParaRPr>
           </a:p>
           <a:p>
             <a:pPr marL="400050" lvl="1" indent="0">
@@ -36444,25 +36135,7 @@
                 </a:solidFill>
                 <a:latin typeface="Consolas" panose="020B0609020204030204" pitchFamily="49" charset="0"/>
               </a:rPr>
-              <a:t>	</a:t>
-            </a:r>
-            <a:r>
-              <a:rPr lang="en-US" sz="4000" dirty="0" smtClean="0">
-                <a:solidFill>
-                  <a:srgbClr val="008000"/>
-                </a:solidFill>
-                <a:latin typeface="Consolas" panose="020B0609020204030204" pitchFamily="49" charset="0"/>
-              </a:rPr>
-              <a:t>// </a:t>
-            </a:r>
-            <a:r>
-              <a:rPr lang="en-US" sz="4000" dirty="0">
-                <a:solidFill>
-                  <a:srgbClr val="008000"/>
-                </a:solidFill>
-                <a:latin typeface="Consolas" panose="020B0609020204030204" pitchFamily="49" charset="0"/>
-              </a:rPr>
-              <a:t>code</a:t>
+              <a:t>	// code</a:t>
             </a:r>
             <a:endParaRPr lang="en-US" sz="4000" dirty="0">
               <a:solidFill>
@@ -36489,7 +36162,7 @@
             <a:pPr marL="57150" indent="0">
               <a:buNone/>
             </a:pPr>
-            <a:endParaRPr lang="en-US" dirty="0" smtClean="0"/>
+            <a:endParaRPr lang="en-US" dirty="0"/>
           </a:p>
         </p:txBody>
       </p:sp>
@@ -36506,13 +36179,6 @@
   <p:transition>
     <p:fade/>
   </p:transition>
-  <p:timing>
-    <p:tnLst>
-      <p:par>
-        <p:cTn id="1" dur="indefinite" restart="never" nodeType="tmRoot"/>
-      </p:par>
-    </p:tnLst>
-  </p:timing>
 </p:sld>
 </file>
 
@@ -36559,10 +36225,9 @@
           <a:lstStyle/>
           <a:p>
             <a:r>
-              <a:rPr lang="en-US" dirty="0" smtClean="0"/>
+              <a:rPr lang="en-US" dirty="0"/>
               <a:t>Mini-Quiz: What data type is a condition?</a:t>
             </a:r>
-            <a:endParaRPr lang="en-US" dirty="0"/>
           </a:p>
         </p:txBody>
       </p:sp>
@@ -36587,18 +36252,13 @@
               <a:buNone/>
             </a:pPr>
             <a:r>
-              <a:rPr lang="en-US" sz="11500" dirty="0" smtClean="0">
+              <a:rPr lang="en-US" sz="11500" dirty="0">
                 <a:solidFill>
                   <a:schemeClr val="bg1"/>
                 </a:solidFill>
               </a:rPr>
               <a:t>Boolean</a:t>
             </a:r>
-            <a:endParaRPr lang="en-US" sz="11500" dirty="0">
-              <a:solidFill>
-                <a:schemeClr val="bg1"/>
-              </a:solidFill>
-            </a:endParaRPr>
           </a:p>
         </p:txBody>
       </p:sp>
@@ -36799,7 +36459,7 @@
           <a:lstStyle/>
           <a:p>
             <a:r>
-              <a:rPr lang="en-US" cap="none" dirty="0" smtClean="0">
+              <a:rPr lang="en-US" cap="none" dirty="0">
                 <a:solidFill>
                   <a:srgbClr val="0000FF"/>
                 </a:solidFill>
@@ -36808,12 +36468,8 @@
               <a:t>while</a:t>
             </a:r>
             <a:r>
-              <a:rPr lang="en-US" dirty="0" smtClean="0"/>
-              <a:t> Loop </a:t>
-            </a:r>
-            <a:r>
               <a:rPr lang="en-US" dirty="0"/>
-              <a:t>flowchart</a:t>
+              <a:t> Loop flowchart</a:t>
             </a:r>
           </a:p>
         </p:txBody>
@@ -36857,13 +36513,6 @@
   <p:transition>
     <p:fade/>
   </p:transition>
-  <p:timing>
-    <p:tnLst>
-      <p:par>
-        <p:cTn id="1" dur="indefinite" restart="never" nodeType="tmRoot"/>
-      </p:par>
-    </p:tnLst>
-  </p:timing>
 </p:sld>
 </file>
 
@@ -36900,10 +36549,9 @@
           <a:lstStyle/>
           <a:p>
             <a:r>
-              <a:rPr lang="en-US" dirty="0" smtClean="0"/>
+              <a:rPr lang="en-US" dirty="0"/>
               <a:t>Whiteboard Example</a:t>
             </a:r>
-            <a:endParaRPr lang="en-US" dirty="0"/>
           </a:p>
         </p:txBody>
       </p:sp>
@@ -36973,15 +36621,6 @@
             <a:pPr marL="0" indent="0">
               <a:buNone/>
             </a:pPr>
-            <a:r>
-              <a:rPr lang="en-US" sz="4000" dirty="0">
-                <a:solidFill>
-                  <a:srgbClr val="000000"/>
-                </a:solidFill>
-                <a:latin typeface="Consolas" panose="020B0609020204030204" pitchFamily="49" charset="0"/>
-              </a:rPr>
-              <a:t/>
-            </a:r>
             <a:br>
               <a:rPr lang="en-US" sz="4000" dirty="0">
                 <a:solidFill>
@@ -37102,19 +36741,10 @@
                 </a:solidFill>
                 <a:latin typeface="Consolas" panose="020B0609020204030204" pitchFamily="49" charset="0"/>
               </a:rPr>
-              <a:t>	</a:t>
+              <a:t>	count </a:t>
             </a:r>
             <a:r>
-              <a:rPr lang="en-US" sz="4000" dirty="0" smtClean="0">
-                <a:solidFill>
-                  <a:srgbClr val="000000"/>
-                </a:solidFill>
-                <a:latin typeface="Consolas" panose="020B0609020204030204" pitchFamily="49" charset="0"/>
-              </a:rPr>
-              <a:t>count </a:t>
-            </a:r>
-            <a:r>
-              <a:rPr lang="en-US" sz="4000" smtClean="0">
+              <a:rPr lang="en-US" sz="4000">
                 <a:solidFill>
                   <a:srgbClr val="000000"/>
                 </a:solidFill>
@@ -37134,7 +36764,7 @@
               <a:buNone/>
             </a:pPr>
             <a:r>
-              <a:rPr lang="en-US" sz="4000" dirty="0" smtClean="0">
+              <a:rPr lang="en-US" sz="4000" dirty="0">
                 <a:solidFill>
                   <a:srgbClr val="000000"/>
                 </a:solidFill>
@@ -37142,12 +36772,6 @@
               </a:rPr>
               <a:t>}</a:t>
             </a:r>
-            <a:endParaRPr lang="en-US" sz="4000" dirty="0">
-              <a:solidFill>
-                <a:srgbClr val="000000"/>
-              </a:solidFill>
-              <a:latin typeface="Consolas" panose="020B0609020204030204" pitchFamily="49" charset="0"/>
-            </a:endParaRPr>
           </a:p>
         </p:txBody>
       </p:sp>
@@ -37226,7 +36850,7 @@
                   <a:spcPct val="0"/>
                 </a:spcAft>
               </a:pPr>
-              <a:endParaRPr lang="en-US" sz="1000" dirty="0" smtClean="0">
+              <a:endParaRPr lang="en-US" sz="1000" dirty="0">
                 <a:solidFill>
                   <a:schemeClr val="tx1">
                     <a:lumMod val="50000"/>
@@ -37314,7 +36938,7 @@
               </a:spcAft>
             </a:pPr>
             <a:r>
-              <a:rPr lang="en-US" sz="4000" dirty="0" smtClean="0">
+              <a:rPr lang="en-US" sz="4000" dirty="0">
                 <a:gradFill>
                   <a:gsLst>
                     <a:gs pos="2917">
@@ -37365,7 +36989,7 @@
               </a:spcAft>
             </a:pPr>
             <a:r>
-              <a:rPr lang="en-US" sz="4000" dirty="0" smtClean="0">
+              <a:rPr lang="en-US" sz="4000" dirty="0">
                 <a:gradFill>
                   <a:gsLst>
                     <a:gs pos="2917">
@@ -37416,7 +37040,7 @@
               </a:spcAft>
             </a:pPr>
             <a:r>
-              <a:rPr lang="en-US" sz="4000" dirty="0" smtClean="0">
+              <a:rPr lang="en-US" sz="4000" dirty="0">
                 <a:gradFill>
                   <a:gsLst>
                     <a:gs pos="2917">
@@ -37467,7 +37091,7 @@
               </a:spcAft>
             </a:pPr>
             <a:r>
-              <a:rPr lang="en-US" sz="4000" dirty="0" smtClean="0">
+              <a:rPr lang="en-US" sz="4000" dirty="0">
                 <a:gradFill>
                   <a:gsLst>
                     <a:gs pos="2917">
@@ -37518,7 +37142,7 @@
               </a:spcAft>
             </a:pPr>
             <a:r>
-              <a:rPr lang="en-US" sz="4000" dirty="0" smtClean="0">
+              <a:rPr lang="en-US" sz="4000" dirty="0">
                 <a:gradFill>
                   <a:gsLst>
                     <a:gs pos="2917">
@@ -37569,7 +37193,7 @@
               </a:spcAft>
             </a:pPr>
             <a:r>
-              <a:rPr lang="en-US" sz="4000" dirty="0" smtClean="0">
+              <a:rPr lang="en-US" sz="4000" dirty="0">
                 <a:gradFill>
                   <a:gsLst>
                     <a:gs pos="2917">
@@ -37620,7 +37244,7 @@
               </a:spcAft>
             </a:pPr>
             <a:r>
-              <a:rPr lang="en-US" sz="4000" dirty="0" smtClean="0">
+              <a:rPr lang="en-US" sz="4000" dirty="0">
                 <a:gradFill>
                   <a:gsLst>
                     <a:gs pos="2917">
@@ -37713,7 +37337,7 @@
                   <a:spcPct val="0"/>
                 </a:spcAft>
               </a:pPr>
-              <a:endParaRPr lang="en-US" sz="1000" dirty="0" smtClean="0">
+              <a:endParaRPr lang="en-US" sz="1000" dirty="0">
                 <a:solidFill>
                   <a:schemeClr val="tx1">
                     <a:lumMod val="50000"/>
@@ -39017,10 +38641,9 @@
           <a:lstStyle/>
           <a:p>
             <a:r>
-              <a:rPr lang="en-US" dirty="0" smtClean="0"/>
+              <a:rPr lang="en-US" dirty="0"/>
               <a:t>Mini-Quiz: What would the user see? </a:t>
             </a:r>
-            <a:endParaRPr lang="en-US" dirty="0"/>
           </a:p>
         </p:txBody>
       </p:sp>
@@ -39095,7 +38718,7 @@
               <a:t>3</a:t>
             </a:r>
             <a:r>
-              <a:rPr lang="en-US" sz="5400" dirty="0" smtClean="0">
+              <a:rPr lang="en-US" sz="5400" dirty="0">
                 <a:solidFill>
                   <a:srgbClr val="D4D4D4"/>
                 </a:solidFill>
@@ -39103,12 +38726,6 @@
               </a:rPr>
               <a:t>) {</a:t>
             </a:r>
-            <a:endParaRPr lang="en-US" sz="5400" dirty="0">
-              <a:solidFill>
-                <a:srgbClr val="D4D4D4"/>
-              </a:solidFill>
-              <a:latin typeface="Consolas" panose="020B0609020204030204" pitchFamily="49" charset="0"/>
-            </a:endParaRPr>
           </a:p>
           <a:p>
             <a:pPr marL="57150" indent="0">
@@ -39232,14 +38849,14 @@
               </a:spcAft>
             </a:pPr>
             <a:r>
-              <a:rPr lang="en-US" sz="9600" dirty="0" smtClean="0">
+              <a:rPr lang="en-US" sz="9600" dirty="0">
                 <a:solidFill>
                   <a:schemeClr val="bg1"/>
                 </a:solidFill>
               </a:rPr>
               <a:t>Stars Forever</a:t>
             </a:r>
-            <a:endParaRPr lang="en-US" sz="3200" dirty="0" smtClean="0">
+            <a:endParaRPr lang="en-US" sz="3200" dirty="0">
               <a:solidFill>
                 <a:schemeClr val="bg1"/>
               </a:solidFill>
@@ -39441,11 +39058,11 @@
           <a:lstStyle/>
           <a:p>
             <a:r>
-              <a:rPr lang="en-US" dirty="0" smtClean="0"/>
+              <a:rPr lang="en-US" dirty="0"/>
               <a:t>The % operator – modulo </a:t>
             </a:r>
             <a:r>
-              <a:rPr lang="en-US" smtClean="0"/>
+              <a:rPr lang="en-US"/>
               <a:t>/ Remainder</a:t>
             </a:r>
             <a:endParaRPr lang="en-US" dirty="0"/>
@@ -39475,24 +39092,24 @@
           <a:lstStyle/>
           <a:p>
             <a:r>
-              <a:rPr lang="en-US" dirty="0" smtClean="0"/>
+              <a:rPr lang="en-US" dirty="0"/>
               <a:t>The remainder operator </a:t>
             </a:r>
             <a:r>
-              <a:rPr lang="en-US" b="1" dirty="0" smtClean="0"/>
+              <a:rPr lang="en-US" b="1" dirty="0"/>
               <a:t>%</a:t>
             </a:r>
             <a:r>
-              <a:rPr lang="en-US" dirty="0" smtClean="0"/>
+              <a:rPr lang="en-US" dirty="0"/>
               <a:t> computes the remainder after dividing the left number by the right number. </a:t>
             </a:r>
             <a:r>
-              <a:rPr lang="en-US" dirty="0" smtClean="0">
+              <a:rPr lang="en-US" dirty="0">
                 <a:hlinkClick r:id="rId2"/>
               </a:rPr>
               <a:t>Remainder Example</a:t>
             </a:r>
-            <a:endParaRPr lang="en-US" dirty="0" smtClean="0"/>
+            <a:endParaRPr lang="en-US" dirty="0"/>
           </a:p>
           <a:p>
             <a:pPr marL="57150" indent="0">
@@ -39525,10 +39142,10 @@
           <a:lstStyle/>
           <a:p>
             <a:r>
-              <a:rPr lang="en-US" sz="3600" b="1" dirty="0" smtClean="0"/>
+              <a:rPr lang="en-US" sz="3600" b="1" dirty="0"/>
               <a:t>Mini-Quiz</a:t>
             </a:r>
-            <a:endParaRPr lang="en-US" sz="4800" dirty="0" smtClean="0">
+            <a:endParaRPr lang="en-US" sz="4800" dirty="0">
               <a:solidFill>
                 <a:srgbClr val="098658"/>
               </a:solidFill>
@@ -39541,7 +39158,7 @@
               <a:buChar char="•"/>
             </a:pPr>
             <a:r>
-              <a:rPr lang="en-US" sz="4800" dirty="0" smtClean="0">
+              <a:rPr lang="en-US" sz="4800" dirty="0">
                 <a:solidFill>
                   <a:srgbClr val="098658"/>
                 </a:solidFill>
@@ -39559,7 +39176,7 @@
               <a:t> % </a:t>
             </a:r>
             <a:r>
-              <a:rPr lang="en-US" sz="4800" dirty="0" smtClean="0">
+              <a:rPr lang="en-US" sz="4800" dirty="0">
                 <a:solidFill>
                   <a:srgbClr val="098658"/>
                 </a:solidFill>
@@ -39598,7 +39215,7 @@
               <a:t> % </a:t>
             </a:r>
             <a:r>
-              <a:rPr lang="en-US" sz="4800" dirty="0" smtClean="0">
+              <a:rPr lang="en-US" sz="4800" dirty="0">
                 <a:solidFill>
                   <a:srgbClr val="098658"/>
                 </a:solidFill>
@@ -39637,7 +39254,7 @@
               <a:t> % </a:t>
             </a:r>
             <a:r>
-              <a:rPr lang="en-US" sz="4800" dirty="0" smtClean="0">
+              <a:rPr lang="en-US" sz="4800" dirty="0">
                 <a:solidFill>
                   <a:srgbClr val="098658"/>
                 </a:solidFill>
@@ -39676,7 +39293,7 @@
               <a:t> % </a:t>
             </a:r>
             <a:r>
-              <a:rPr lang="en-US" sz="4800" dirty="0" smtClean="0">
+              <a:rPr lang="en-US" sz="4800" dirty="0">
                 <a:solidFill>
                   <a:srgbClr val="098658"/>
                 </a:solidFill>
@@ -39715,63 +39332,12 @@
           </a:bodyPr>
           <a:lstStyle/>
           <a:p>
-            <a:endParaRPr lang="en-US" sz="3200" dirty="0" smtClean="0"/>
+            <a:endParaRPr lang="en-US" sz="3200" dirty="0"/>
           </a:p>
           <a:p>
             <a:r>
-              <a:rPr lang="en-US" sz="4800" dirty="0" smtClean="0"/>
+              <a:rPr lang="en-US" sz="4800" dirty="0"/>
               <a:t>→</a:t>
-            </a:r>
-            <a:r>
-              <a:rPr lang="en-US" sz="4800" dirty="0" smtClean="0">
-                <a:solidFill>
-                  <a:srgbClr val="098658"/>
-                </a:solidFill>
-                <a:latin typeface="Consolas" panose="020B0609020204030204" pitchFamily="49" charset="0"/>
-              </a:rPr>
-              <a:t> 2</a:t>
-            </a:r>
-            <a:endParaRPr lang="en-US" sz="4800" dirty="0" smtClean="0">
-              <a:solidFill>
-                <a:srgbClr val="000000"/>
-              </a:solidFill>
-              <a:latin typeface="Consolas" panose="020B0609020204030204" pitchFamily="49" charset="0"/>
-            </a:endParaRPr>
-          </a:p>
-          <a:p>
-            <a:r>
-              <a:rPr lang="en-US" sz="4800" dirty="0" smtClean="0"/>
-              <a:t>→</a:t>
-            </a:r>
-            <a:r>
-              <a:rPr lang="en-US" sz="4800" dirty="0" smtClean="0">
-                <a:solidFill>
-                  <a:srgbClr val="098658"/>
-                </a:solidFill>
-                <a:latin typeface="Consolas" panose="020B0609020204030204" pitchFamily="49" charset="0"/>
-              </a:rPr>
-              <a:t> 0</a:t>
-            </a:r>
-            <a:endParaRPr lang="en-US" sz="4800" dirty="0" smtClean="0">
-              <a:solidFill>
-                <a:srgbClr val="000000"/>
-              </a:solidFill>
-              <a:latin typeface="Consolas" panose="020B0609020204030204" pitchFamily="49" charset="0"/>
-            </a:endParaRPr>
-          </a:p>
-          <a:p>
-            <a:r>
-              <a:rPr lang="en-US" sz="4800" dirty="0" smtClean="0"/>
-              <a:t>→</a:t>
-            </a:r>
-            <a:r>
-              <a:rPr lang="en-US" sz="4800" dirty="0" smtClean="0">
-                <a:solidFill>
-                  <a:srgbClr val="098658"/>
-                </a:solidFill>
-                <a:latin typeface="Consolas" panose="020B0609020204030204" pitchFamily="49" charset="0"/>
-              </a:rPr>
-              <a:t> </a:t>
             </a:r>
             <a:r>
               <a:rPr lang="en-US" sz="4800" dirty="0">
@@ -39780,7 +39346,7 @@
                 </a:solidFill>
                 <a:latin typeface="Consolas" panose="020B0609020204030204" pitchFamily="49" charset="0"/>
               </a:rPr>
-              <a:t>0</a:t>
+              <a:t> 2</a:t>
             </a:r>
             <a:endParaRPr lang="en-US" sz="4800" dirty="0">
               <a:solidFill>
@@ -39791,17 +39357,8 @@
           </a:p>
           <a:p>
             <a:r>
-              <a:rPr lang="en-US" sz="4800" dirty="0" smtClean="0"/>
+              <a:rPr lang="en-US" sz="4800" dirty="0"/>
               <a:t>→</a:t>
-            </a:r>
-            <a:r>
-              <a:rPr lang="en-US" sz="4800" dirty="0" smtClean="0">
-                <a:solidFill>
-                  <a:srgbClr val="098658"/>
-                </a:solidFill>
-                <a:latin typeface="Consolas" panose="020B0609020204030204" pitchFamily="49" charset="0"/>
-              </a:rPr>
-              <a:t> </a:t>
             </a:r>
             <a:r>
               <a:rPr lang="en-US" sz="4800" dirty="0">
@@ -39810,7 +39367,49 @@
                 </a:solidFill>
                 <a:latin typeface="Consolas" panose="020B0609020204030204" pitchFamily="49" charset="0"/>
               </a:rPr>
-              <a:t>1</a:t>
+              <a:t> 0</a:t>
+            </a:r>
+            <a:endParaRPr lang="en-US" sz="4800" dirty="0">
+              <a:solidFill>
+                <a:srgbClr val="000000"/>
+              </a:solidFill>
+              <a:latin typeface="Consolas" panose="020B0609020204030204" pitchFamily="49" charset="0"/>
+            </a:endParaRPr>
+          </a:p>
+          <a:p>
+            <a:r>
+              <a:rPr lang="en-US" sz="4800" dirty="0"/>
+              <a:t>→</a:t>
+            </a:r>
+            <a:r>
+              <a:rPr lang="en-US" sz="4800" dirty="0">
+                <a:solidFill>
+                  <a:srgbClr val="098658"/>
+                </a:solidFill>
+                <a:latin typeface="Consolas" panose="020B0609020204030204" pitchFamily="49" charset="0"/>
+              </a:rPr>
+              <a:t> 0</a:t>
+            </a:r>
+            <a:endParaRPr lang="en-US" sz="4800" dirty="0">
+              <a:solidFill>
+                <a:srgbClr val="000000"/>
+              </a:solidFill>
+              <a:latin typeface="Consolas" panose="020B0609020204030204" pitchFamily="49" charset="0"/>
+            </a:endParaRPr>
+          </a:p>
+          <a:p>
+            <a:r>
+              <a:rPr lang="en-US" sz="4800" dirty="0"/>
+              <a:t>→</a:t>
+            </a:r>
+            <a:r>
+              <a:rPr lang="en-US" sz="4800" dirty="0">
+                <a:solidFill>
+                  <a:srgbClr val="098658"/>
+                </a:solidFill>
+                <a:latin typeface="Consolas" panose="020B0609020204030204" pitchFamily="49" charset="0"/>
+              </a:rPr>
+              <a:t> 1</a:t>
             </a:r>
             <a:endParaRPr lang="en-US" sz="4800" dirty="0">
               <a:solidFill>
@@ -39862,7 +39461,7 @@
               </a:spcAft>
             </a:pPr>
             <a:r>
-              <a:rPr lang="en-US" sz="3600" b="1" dirty="0" smtClean="0">
+              <a:rPr lang="en-US" sz="3600" b="1" dirty="0">
                 <a:solidFill>
                   <a:schemeClr val="accent2">
                     <a:lumMod val="50000"/>
@@ -39881,7 +39480,7 @@
                 <a:spcPts val="600"/>
               </a:spcAft>
             </a:pPr>
-            <a:endParaRPr lang="en-US" sz="2800" b="1" dirty="0" smtClean="0">
+            <a:endParaRPr lang="en-US" sz="2800" b="1" dirty="0">
               <a:gradFill>
                 <a:gsLst>
                   <a:gs pos="2917">
@@ -39990,7 +39589,7 @@
           </a:p>
           <a:p>
             <a:r>
-              <a:rPr lang="en-US" sz="4000" dirty="0" smtClean="0">
+              <a:rPr lang="en-US" sz="4000" dirty="0">
                 <a:solidFill>
                   <a:srgbClr val="000000"/>
                 </a:solidFill>
@@ -39998,12 +39597,6 @@
               </a:rPr>
               <a:t>}</a:t>
             </a:r>
-            <a:endParaRPr lang="en-US" sz="4000" dirty="0">
-              <a:solidFill>
-                <a:srgbClr val="000000"/>
-              </a:solidFill>
-              <a:latin typeface="Consolas" panose="020B0609020204030204" pitchFamily="49" charset="0"/>
-            </a:endParaRPr>
           </a:p>
         </p:txBody>
       </p:sp>
@@ -41019,7 +40612,7 @@
               </a:spcAft>
             </a:pPr>
             <a:r>
-              <a:rPr lang="en-US" sz="13800" dirty="0" err="1" smtClean="0">
+              <a:rPr lang="en-US" sz="13800" dirty="0" err="1">
                 <a:gradFill>
                   <a:gsLst>
                     <a:gs pos="2917">
@@ -41036,7 +40629,7 @@
               <a:t>Repl</a:t>
             </a:r>
             <a:r>
-              <a:rPr lang="en-US" sz="13800" dirty="0" smtClean="0">
+              <a:rPr lang="en-US" sz="13800" dirty="0">
                 <a:gradFill>
                   <a:gsLst>
                     <a:gs pos="2917">
@@ -41052,7 +40645,7 @@
               </a:rPr>
               <a:t>!</a:t>
             </a:r>
-            <a:endParaRPr lang="en-US" sz="13800" dirty="0" smtClean="0">
+            <a:endParaRPr lang="en-US" sz="13800" dirty="0">
               <a:gradFill>
                 <a:gsLst>
                   <a:gs pos="2917">
@@ -41081,13 +40674,6 @@
   <p:transition>
     <p:fade/>
   </p:transition>
-  <p:timing>
-    <p:tnLst>
-      <p:par>
-        <p:cTn id="1" dur="indefinite" restart="never" nodeType="tmRoot"/>
-      </p:par>
-    </p:tnLst>
-  </p:timing>
 </p:sld>
 </file>
 

</xml_diff>

<commit_message>
add while loops practice game
</commit_message>
<xml_diff>
--- a/WhileLoops/WhileLoops.pptx
+++ b/WhileLoops/WhileLoops.pptx
@@ -36135,7 +36135,16 @@
                 </a:solidFill>
                 <a:latin typeface="Consolas" panose="020B0609020204030204" pitchFamily="49" charset="0"/>
               </a:rPr>
-              <a:t>	// code</a:t>
+              <a:t>	</a:t>
+            </a:r>
+            <a:r>
+              <a:rPr lang="en-US" sz="4000">
+                <a:solidFill>
+                  <a:srgbClr val="008000"/>
+                </a:solidFill>
+                <a:latin typeface="Consolas" panose="020B0609020204030204" pitchFamily="49" charset="0"/>
+              </a:rPr>
+              <a:t>// body</a:t>
             </a:r>
             <a:endParaRPr lang="en-US" sz="4000" dirty="0">
               <a:solidFill>

</xml_diff>